<commit_message>
exercises.html all-slides.pdf recursion.pdf recursion.pptx
</commit_message>
<xml_diff>
--- a/ipsa/slides/recursion.pptx
+++ b/ipsa/slides/recursion.pptx
@@ -133,268 +133,8 @@
 </p:presentation>
 </file>
 
-<file path=ppt/revisionInfo.xml><?xml version="1.0" encoding="utf-8"?>
-<p1510:revInfo xmlns:a="http://schemas.openxmlformats.org/drawingml/2006/main" xmlns:r="http://schemas.openxmlformats.org/officeDocument/2006/relationships" xmlns:p1510="http://schemas.microsoft.com/office/powerpoint/2015/10/main">
-  <p1510:revLst>
-    <p1510:client id="{C2D62179-613D-4612-B99D-80773BC59D82}" v="2" dt="2024-02-26T08:09:34.899"/>
-  </p1510:revLst>
-</p1510:revInfo>
-</file>
-
 <file path=ppt/changesInfos/changesInfo1.xml><?xml version="1.0" encoding="utf-8"?>
 <pc:chgInfo xmlns:a="http://schemas.openxmlformats.org/drawingml/2006/main" xmlns:r="http://schemas.openxmlformats.org/officeDocument/2006/relationships" xmlns:ac="http://schemas.microsoft.com/office/drawing/2013/main/command" xmlns:pc="http://schemas.microsoft.com/office/powerpoint/2013/main/command">
-  <pc:docChgLst>
-    <pc:chgData name="Gerth Stølting Brodal" userId="04ef4784-6591-4f86-a140-f5c3b108582a" providerId="ADAL" clId="{1469466D-464E-4DC8-B62D-B95481E21BC1}"/>
-    <pc:docChg chg="undo custSel addSld delSld modSld">
-      <pc:chgData name="Gerth Stølting Brodal" userId="04ef4784-6591-4f86-a140-f5c3b108582a" providerId="ADAL" clId="{1469466D-464E-4DC8-B62D-B95481E21BC1}" dt="2022-04-06T04:59:21.138" v="837" actId="20577"/>
-      <pc:docMkLst>
-        <pc:docMk/>
-      </pc:docMkLst>
-      <pc:sldChg chg="modSp mod">
-        <pc:chgData name="Gerth Stølting Brodal" userId="04ef4784-6591-4f86-a140-f5c3b108582a" providerId="ADAL" clId="{1469466D-464E-4DC8-B62D-B95481E21BC1}" dt="2022-04-05T19:48:08.321" v="190" actId="20577"/>
-        <pc:sldMkLst>
-          <pc:docMk/>
-          <pc:sldMk cId="1177245852" sldId="590"/>
-        </pc:sldMkLst>
-        <pc:graphicFrameChg chg="modGraphic">
-          <ac:chgData name="Gerth Stølting Brodal" userId="04ef4784-6591-4f86-a140-f5c3b108582a" providerId="ADAL" clId="{1469466D-464E-4DC8-B62D-B95481E21BC1}" dt="2022-04-05T19:48:08.321" v="190" actId="20577"/>
-          <ac:graphicFrameMkLst>
-            <pc:docMk/>
-            <pc:sldMk cId="1177245852" sldId="590"/>
-            <ac:graphicFrameMk id="4" creationId="{00000000-0000-0000-0000-000000000000}"/>
-          </ac:graphicFrameMkLst>
-        </pc:graphicFrameChg>
-      </pc:sldChg>
-      <pc:sldChg chg="modSp mod">
-        <pc:chgData name="Gerth Stølting Brodal" userId="04ef4784-6591-4f86-a140-f5c3b108582a" providerId="ADAL" clId="{1469466D-464E-4DC8-B62D-B95481E21BC1}" dt="2022-04-05T19:48:23.681" v="192" actId="20577"/>
-        <pc:sldMkLst>
-          <pc:docMk/>
-          <pc:sldMk cId="1526489455" sldId="592"/>
-        </pc:sldMkLst>
-        <pc:graphicFrameChg chg="modGraphic">
-          <ac:chgData name="Gerth Stølting Brodal" userId="04ef4784-6591-4f86-a140-f5c3b108582a" providerId="ADAL" clId="{1469466D-464E-4DC8-B62D-B95481E21BC1}" dt="2022-04-05T19:48:23.681" v="192" actId="20577"/>
-          <ac:graphicFrameMkLst>
-            <pc:docMk/>
-            <pc:sldMk cId="1526489455" sldId="592"/>
-            <ac:graphicFrameMk id="4" creationId="{00000000-0000-0000-0000-000000000000}"/>
-          </ac:graphicFrameMkLst>
-        </pc:graphicFrameChg>
-      </pc:sldChg>
-      <pc:sldChg chg="modSp mod">
-        <pc:chgData name="Gerth Stølting Brodal" userId="04ef4784-6591-4f86-a140-f5c3b108582a" providerId="ADAL" clId="{1469466D-464E-4DC8-B62D-B95481E21BC1}" dt="2022-04-05T19:48:28.682" v="193" actId="6549"/>
-        <pc:sldMkLst>
-          <pc:docMk/>
-          <pc:sldMk cId="3354709852" sldId="593"/>
-        </pc:sldMkLst>
-        <pc:graphicFrameChg chg="modGraphic">
-          <ac:chgData name="Gerth Stølting Brodal" userId="04ef4784-6591-4f86-a140-f5c3b108582a" providerId="ADAL" clId="{1469466D-464E-4DC8-B62D-B95481E21BC1}" dt="2022-04-05T19:48:28.682" v="193" actId="6549"/>
-          <ac:graphicFrameMkLst>
-            <pc:docMk/>
-            <pc:sldMk cId="3354709852" sldId="593"/>
-            <ac:graphicFrameMk id="4" creationId="{00000000-0000-0000-0000-000000000000}"/>
-          </ac:graphicFrameMkLst>
-        </pc:graphicFrameChg>
-      </pc:sldChg>
-      <pc:sldChg chg="modSp mod">
-        <pc:chgData name="Gerth Stølting Brodal" userId="04ef4784-6591-4f86-a140-f5c3b108582a" providerId="ADAL" clId="{1469466D-464E-4DC8-B62D-B95481E21BC1}" dt="2022-04-05T19:48:34.575" v="194" actId="20577"/>
-        <pc:sldMkLst>
-          <pc:docMk/>
-          <pc:sldMk cId="3608860866" sldId="599"/>
-        </pc:sldMkLst>
-        <pc:graphicFrameChg chg="modGraphic">
-          <ac:chgData name="Gerth Stølting Brodal" userId="04ef4784-6591-4f86-a140-f5c3b108582a" providerId="ADAL" clId="{1469466D-464E-4DC8-B62D-B95481E21BC1}" dt="2022-04-05T19:48:34.575" v="194" actId="20577"/>
-          <ac:graphicFrameMkLst>
-            <pc:docMk/>
-            <pc:sldMk cId="3608860866" sldId="599"/>
-            <ac:graphicFrameMk id="5" creationId="{00000000-0000-0000-0000-000000000000}"/>
-          </ac:graphicFrameMkLst>
-        </pc:graphicFrameChg>
-      </pc:sldChg>
-      <pc:sldChg chg="del">
-        <pc:chgData name="Gerth Stølting Brodal" userId="04ef4784-6591-4f86-a140-f5c3b108582a" providerId="ADAL" clId="{1469466D-464E-4DC8-B62D-B95481E21BC1}" dt="2022-04-05T16:59:31.022" v="0" actId="47"/>
-        <pc:sldMkLst>
-          <pc:docMk/>
-          <pc:sldMk cId="1041664159" sldId="603"/>
-        </pc:sldMkLst>
-      </pc:sldChg>
-      <pc:sldChg chg="addSp delSp modSp new mod addAnim delAnim modAnim modNotesTx">
-        <pc:chgData name="Gerth Stølting Brodal" userId="04ef4784-6591-4f86-a140-f5c3b108582a" providerId="ADAL" clId="{1469466D-464E-4DC8-B62D-B95481E21BC1}" dt="2022-04-06T04:59:21.138" v="837" actId="20577"/>
-        <pc:sldMkLst>
-          <pc:docMk/>
-          <pc:sldMk cId="1429464979" sldId="608"/>
-        </pc:sldMkLst>
-        <pc:spChg chg="mod">
-          <ac:chgData name="Gerth Stølting Brodal" userId="04ef4784-6591-4f86-a140-f5c3b108582a" providerId="ADAL" clId="{1469466D-464E-4DC8-B62D-B95481E21BC1}" dt="2022-04-06T04:56:44.157" v="711" actId="20577"/>
-          <ac:spMkLst>
-            <pc:docMk/>
-            <pc:sldMk cId="1429464979" sldId="608"/>
-            <ac:spMk id="2" creationId="{16900BCC-51B6-40D8-AC04-CD22C1F85DE7}"/>
-          </ac:spMkLst>
-        </pc:spChg>
-        <pc:spChg chg="del">
-          <ac:chgData name="Gerth Stølting Brodal" userId="04ef4784-6591-4f86-a140-f5c3b108582a" providerId="ADAL" clId="{1469466D-464E-4DC8-B62D-B95481E21BC1}" dt="2022-04-05T19:38:05.275" v="73" actId="478"/>
-          <ac:spMkLst>
-            <pc:docMk/>
-            <pc:sldMk cId="1429464979" sldId="608"/>
-            <ac:spMk id="3" creationId="{82C9A732-E1D7-4953-BF9E-C0E944EA63CD}"/>
-          </ac:spMkLst>
-        </pc:spChg>
-        <pc:spChg chg="add del">
-          <ac:chgData name="Gerth Stølting Brodal" userId="04ef4784-6591-4f86-a140-f5c3b108582a" providerId="ADAL" clId="{1469466D-464E-4DC8-B62D-B95481E21BC1}" dt="2022-04-05T19:19:33.179" v="26" actId="22"/>
-          <ac:spMkLst>
-            <pc:docMk/>
-            <pc:sldMk cId="1429464979" sldId="608"/>
-            <ac:spMk id="5" creationId="{229B5CAA-1913-4F6B-AFD8-4DAA644DA73C}"/>
-          </ac:spMkLst>
-        </pc:spChg>
-        <pc:spChg chg="add del">
-          <ac:chgData name="Gerth Stølting Brodal" userId="04ef4784-6591-4f86-a140-f5c3b108582a" providerId="ADAL" clId="{1469466D-464E-4DC8-B62D-B95481E21BC1}" dt="2022-04-05T19:38:30.926" v="75" actId="22"/>
-          <ac:spMkLst>
-            <pc:docMk/>
-            <pc:sldMk cId="1429464979" sldId="608"/>
-            <ac:spMk id="8" creationId="{525265F7-9054-4F90-BBBD-B808837B35E0}"/>
-          </ac:spMkLst>
-        </pc:spChg>
-        <pc:spChg chg="add del mod">
-          <ac:chgData name="Gerth Stølting Brodal" userId="04ef4784-6591-4f86-a140-f5c3b108582a" providerId="ADAL" clId="{1469466D-464E-4DC8-B62D-B95481E21BC1}" dt="2022-04-05T19:45:56.350" v="185" actId="478"/>
-          <ac:spMkLst>
-            <pc:docMk/>
-            <pc:sldMk cId="1429464979" sldId="608"/>
-            <ac:spMk id="11" creationId="{7E239562-5154-44FE-943A-11D463375896}"/>
-          </ac:spMkLst>
-        </pc:spChg>
-        <pc:spChg chg="add mod">
-          <ac:chgData name="Gerth Stølting Brodal" userId="04ef4784-6591-4f86-a140-f5c3b108582a" providerId="ADAL" clId="{1469466D-464E-4DC8-B62D-B95481E21BC1}" dt="2022-04-06T04:58:14.938" v="732" actId="20577"/>
-          <ac:spMkLst>
-            <pc:docMk/>
-            <pc:sldMk cId="1429464979" sldId="608"/>
-            <ac:spMk id="12" creationId="{AC01858C-058C-406E-9809-010A1986214A}"/>
-          </ac:spMkLst>
-        </pc:spChg>
-        <pc:graphicFrameChg chg="add mod modGraphic">
-          <ac:chgData name="Gerth Stølting Brodal" userId="04ef4784-6591-4f86-a140-f5c3b108582a" providerId="ADAL" clId="{1469466D-464E-4DC8-B62D-B95481E21BC1}" dt="2022-04-05T20:17:38.677" v="544" actId="20577"/>
-          <ac:graphicFrameMkLst>
-            <pc:docMk/>
-            <pc:sldMk cId="1429464979" sldId="608"/>
-            <ac:graphicFrameMk id="6" creationId="{430153D5-9894-4E26-A759-6BEE34861823}"/>
-          </ac:graphicFrameMkLst>
-        </pc:graphicFrameChg>
-        <pc:graphicFrameChg chg="add mod modGraphic">
-          <ac:chgData name="Gerth Stølting Brodal" userId="04ef4784-6591-4f86-a140-f5c3b108582a" providerId="ADAL" clId="{1469466D-464E-4DC8-B62D-B95481E21BC1}" dt="2022-04-05T20:15:34.773" v="535" actId="207"/>
-          <ac:graphicFrameMkLst>
-            <pc:docMk/>
-            <pc:sldMk cId="1429464979" sldId="608"/>
-            <ac:graphicFrameMk id="9" creationId="{6B920E13-B858-4396-9BA7-39071AB1F606}"/>
-          </ac:graphicFrameMkLst>
-        </pc:graphicFrameChg>
-      </pc:sldChg>
-    </pc:docChg>
-  </pc:docChgLst>
-  <pc:docChgLst>
-    <pc:chgData name="Gerth Stølting Brodal" userId="04ef4784-6591-4f86-a140-f5c3b108582a" providerId="ADAL" clId="{C2D62179-613D-4612-B99D-80773BC59D82}"/>
-    <pc:docChg chg="undo custSel modSld">
-      <pc:chgData name="Gerth Stølting Brodal" userId="04ef4784-6591-4f86-a140-f5c3b108582a" providerId="ADAL" clId="{C2D62179-613D-4612-B99D-80773BC59D82}" dt="2024-02-26T08:09:34.899" v="90"/>
-      <pc:docMkLst>
-        <pc:docMk/>
-      </pc:docMkLst>
-      <pc:sldChg chg="modNotesTx">
-        <pc:chgData name="Gerth Stølting Brodal" userId="04ef4784-6591-4f86-a140-f5c3b108582a" providerId="ADAL" clId="{C2D62179-613D-4612-B99D-80773BC59D82}" dt="2024-02-26T08:07:05.182" v="89" actId="6549"/>
-        <pc:sldMkLst>
-          <pc:docMk/>
-          <pc:sldMk cId="567584679" sldId="587"/>
-        </pc:sldMkLst>
-      </pc:sldChg>
-      <pc:sldChg chg="modSp mod">
-        <pc:chgData name="Gerth Stølting Brodal" userId="04ef4784-6591-4f86-a140-f5c3b108582a" providerId="ADAL" clId="{C2D62179-613D-4612-B99D-80773BC59D82}" dt="2024-02-26T07:51:58.368" v="82" actId="207"/>
-        <pc:sldMkLst>
-          <pc:docMk/>
-          <pc:sldMk cId="1526489455" sldId="592"/>
-        </pc:sldMkLst>
-        <pc:graphicFrameChg chg="modGraphic">
-          <ac:chgData name="Gerth Stølting Brodal" userId="04ef4784-6591-4f86-a140-f5c3b108582a" providerId="ADAL" clId="{C2D62179-613D-4612-B99D-80773BC59D82}" dt="2024-02-26T07:51:58.368" v="82" actId="207"/>
-          <ac:graphicFrameMkLst>
-            <pc:docMk/>
-            <pc:sldMk cId="1526489455" sldId="592"/>
-            <ac:graphicFrameMk id="4" creationId="{00000000-0000-0000-0000-000000000000}"/>
-          </ac:graphicFrameMkLst>
-        </pc:graphicFrameChg>
-      </pc:sldChg>
-      <pc:sldChg chg="modSp mod modNotesTx">
-        <pc:chgData name="Gerth Stølting Brodal" userId="04ef4784-6591-4f86-a140-f5c3b108582a" providerId="ADAL" clId="{C2D62179-613D-4612-B99D-80773BC59D82}" dt="2024-02-26T07:52:13.521" v="85" actId="207"/>
-        <pc:sldMkLst>
-          <pc:docMk/>
-          <pc:sldMk cId="3354709852" sldId="593"/>
-        </pc:sldMkLst>
-        <pc:graphicFrameChg chg="modGraphic">
-          <ac:chgData name="Gerth Stølting Brodal" userId="04ef4784-6591-4f86-a140-f5c3b108582a" providerId="ADAL" clId="{C2D62179-613D-4612-B99D-80773BC59D82}" dt="2024-02-26T07:52:13.521" v="85" actId="207"/>
-          <ac:graphicFrameMkLst>
-            <pc:docMk/>
-            <pc:sldMk cId="3354709852" sldId="593"/>
-            <ac:graphicFrameMk id="4" creationId="{00000000-0000-0000-0000-000000000000}"/>
-          </ac:graphicFrameMkLst>
-        </pc:graphicFrameChg>
-      </pc:sldChg>
-      <pc:sldChg chg="modSp">
-        <pc:chgData name="Gerth Stølting Brodal" userId="04ef4784-6591-4f86-a140-f5c3b108582a" providerId="ADAL" clId="{C2D62179-613D-4612-B99D-80773BC59D82}" dt="2024-02-21T08:44:28.631" v="0" actId="6549"/>
-        <pc:sldMkLst>
-          <pc:docMk/>
-          <pc:sldMk cId="3149368856" sldId="596"/>
-        </pc:sldMkLst>
-        <pc:spChg chg="mod">
-          <ac:chgData name="Gerth Stølting Brodal" userId="04ef4784-6591-4f86-a140-f5c3b108582a" providerId="ADAL" clId="{C2D62179-613D-4612-B99D-80773BC59D82}" dt="2024-02-21T08:44:28.631" v="0" actId="6549"/>
-          <ac:spMkLst>
-            <pc:docMk/>
-            <pc:sldMk cId="3149368856" sldId="596"/>
-            <ac:spMk id="3" creationId="{00000000-0000-0000-0000-000000000000}"/>
-          </ac:spMkLst>
-        </pc:spChg>
-      </pc:sldChg>
-      <pc:sldChg chg="modSp mod">
-        <pc:chgData name="Gerth Stølting Brodal" userId="04ef4784-6591-4f86-a140-f5c3b108582a" providerId="ADAL" clId="{C2D62179-613D-4612-B99D-80773BC59D82}" dt="2024-02-21T09:00:15.555" v="64" actId="313"/>
-        <pc:sldMkLst>
-          <pc:docMk/>
-          <pc:sldMk cId="2518119805" sldId="601"/>
-        </pc:sldMkLst>
-        <pc:graphicFrameChg chg="modGraphic">
-          <ac:chgData name="Gerth Stølting Brodal" userId="04ef4784-6591-4f86-a140-f5c3b108582a" providerId="ADAL" clId="{C2D62179-613D-4612-B99D-80773BC59D82}" dt="2024-02-21T09:00:15.555" v="64" actId="313"/>
-          <ac:graphicFrameMkLst>
-            <pc:docMk/>
-            <pc:sldMk cId="2518119805" sldId="601"/>
-            <ac:graphicFrameMk id="4" creationId="{00000000-0000-0000-0000-000000000000}"/>
-          </ac:graphicFrameMkLst>
-        </pc:graphicFrameChg>
-      </pc:sldChg>
-      <pc:sldChg chg="modSp mod">
-        <pc:chgData name="Gerth Stølting Brodal" userId="04ef4784-6591-4f86-a140-f5c3b108582a" providerId="ADAL" clId="{C2D62179-613D-4612-B99D-80773BC59D82}" dt="2024-02-25T19:04:53.683" v="76" actId="6549"/>
-        <pc:sldMkLst>
-          <pc:docMk/>
-          <pc:sldMk cId="1045497289" sldId="602"/>
-        </pc:sldMkLst>
-        <pc:graphicFrameChg chg="modGraphic">
-          <ac:chgData name="Gerth Stølting Brodal" userId="04ef4784-6591-4f86-a140-f5c3b108582a" providerId="ADAL" clId="{C2D62179-613D-4612-B99D-80773BC59D82}" dt="2024-02-25T19:04:53.683" v="76" actId="6549"/>
-          <ac:graphicFrameMkLst>
-            <pc:docMk/>
-            <pc:sldMk cId="1045497289" sldId="602"/>
-            <ac:graphicFrameMk id="4" creationId="{00000000-0000-0000-0000-000000000000}"/>
-          </ac:graphicFrameMkLst>
-        </pc:graphicFrameChg>
-      </pc:sldChg>
-      <pc:sldChg chg="modAnim">
-        <pc:chgData name="Gerth Stølting Brodal" userId="04ef4784-6591-4f86-a140-f5c3b108582a" providerId="ADAL" clId="{C2D62179-613D-4612-B99D-80773BC59D82}" dt="2024-02-26T08:09:34.899" v="90"/>
-        <pc:sldMkLst>
-          <pc:docMk/>
-          <pc:sldMk cId="1220840155" sldId="606"/>
-        </pc:sldMkLst>
-      </pc:sldChg>
-      <pc:sldChg chg="modNotesTx">
-        <pc:chgData name="Gerth Stølting Brodal" userId="04ef4784-6591-4f86-a140-f5c3b108582a" providerId="ADAL" clId="{C2D62179-613D-4612-B99D-80773BC59D82}" dt="2024-02-21T08:56:09.842" v="15" actId="20577"/>
-        <pc:sldMkLst>
-          <pc:docMk/>
-          <pc:sldMk cId="1429464979" sldId="608"/>
-        </pc:sldMkLst>
-      </pc:sldChg>
-    </pc:docChg>
-  </pc:docChgLst>
   <pc:docChgLst>
     <pc:chgData name="Gerth Stølting Brodal" userId="04ef4784-6591-4f86-a140-f5c3b108582a" providerId="ADAL" clId="{9197687F-18F0-42D4-9B72-DE14A28EAE5C}"/>
     <pc:docChg chg="undo custSel addSld delSld modSld">
@@ -415,30 +155,6 @@
           <pc:docMk/>
           <pc:sldMk cId="2445053109" sldId="589"/>
         </pc:sldMkLst>
-        <pc:graphicFrameChg chg="modGraphic">
-          <ac:chgData name="Gerth Stølting Brodal" userId="04ef4784-6591-4f86-a140-f5c3b108582a" providerId="ADAL" clId="{9197687F-18F0-42D4-9B72-DE14A28EAE5C}" dt="2023-03-12T12:55:25.236" v="1461" actId="207"/>
-          <ac:graphicFrameMkLst>
-            <pc:docMk/>
-            <pc:sldMk cId="2445053109" sldId="589"/>
-            <ac:graphicFrameMk id="4" creationId="{00000000-0000-0000-0000-000000000000}"/>
-          </ac:graphicFrameMkLst>
-        </pc:graphicFrameChg>
-        <pc:graphicFrameChg chg="modGraphic">
-          <ac:chgData name="Gerth Stølting Brodal" userId="04ef4784-6591-4f86-a140-f5c3b108582a" providerId="ADAL" clId="{9197687F-18F0-42D4-9B72-DE14A28EAE5C}" dt="2023-03-12T12:55:32.125" v="1462" actId="207"/>
-          <ac:graphicFrameMkLst>
-            <pc:docMk/>
-            <pc:sldMk cId="2445053109" sldId="589"/>
-            <ac:graphicFrameMk id="8" creationId="{00000000-0000-0000-0000-000000000000}"/>
-          </ac:graphicFrameMkLst>
-        </pc:graphicFrameChg>
-        <pc:graphicFrameChg chg="modGraphic">
-          <ac:chgData name="Gerth Stølting Brodal" userId="04ef4784-6591-4f86-a140-f5c3b108582a" providerId="ADAL" clId="{9197687F-18F0-42D4-9B72-DE14A28EAE5C}" dt="2023-03-12T12:55:18.110" v="1460" actId="207"/>
-          <ac:graphicFrameMkLst>
-            <pc:docMk/>
-            <pc:sldMk cId="2445053109" sldId="589"/>
-            <ac:graphicFrameMk id="9" creationId="{00000000-0000-0000-0000-000000000000}"/>
-          </ac:graphicFrameMkLst>
-        </pc:graphicFrameChg>
       </pc:sldChg>
       <pc:sldChg chg="modSp mod">
         <pc:chgData name="Gerth Stølting Brodal" userId="04ef4784-6591-4f86-a140-f5c3b108582a" providerId="ADAL" clId="{9197687F-18F0-42D4-9B72-DE14A28EAE5C}" dt="2023-03-12T12:56:11.529" v="1466" actId="207"/>
@@ -446,14 +162,6 @@
           <pc:docMk/>
           <pc:sldMk cId="1177245852" sldId="590"/>
         </pc:sldMkLst>
-        <pc:graphicFrameChg chg="modGraphic">
-          <ac:chgData name="Gerth Stølting Brodal" userId="04ef4784-6591-4f86-a140-f5c3b108582a" providerId="ADAL" clId="{9197687F-18F0-42D4-9B72-DE14A28EAE5C}" dt="2023-03-12T12:56:11.529" v="1466" actId="207"/>
-          <ac:graphicFrameMkLst>
-            <pc:docMk/>
-            <pc:sldMk cId="1177245852" sldId="590"/>
-            <ac:graphicFrameMk id="4" creationId="{00000000-0000-0000-0000-000000000000}"/>
-          </ac:graphicFrameMkLst>
-        </pc:graphicFrameChg>
       </pc:sldChg>
       <pc:sldChg chg="modSp mod">
         <pc:chgData name="Gerth Stølting Brodal" userId="04ef4784-6591-4f86-a140-f5c3b108582a" providerId="ADAL" clId="{9197687F-18F0-42D4-9B72-DE14A28EAE5C}" dt="2023-02-22T10:34:41.254" v="392" actId="1037"/>
@@ -461,46 +169,6 @@
           <pc:docMk/>
           <pc:sldMk cId="930238539" sldId="595"/>
         </pc:sldMkLst>
-        <pc:spChg chg="mod">
-          <ac:chgData name="Gerth Stølting Brodal" userId="04ef4784-6591-4f86-a140-f5c3b108582a" providerId="ADAL" clId="{9197687F-18F0-42D4-9B72-DE14A28EAE5C}" dt="2023-02-22T10:34:35.046" v="389" actId="1035"/>
-          <ac:spMkLst>
-            <pc:docMk/>
-            <pc:sldMk cId="930238539" sldId="595"/>
-            <ac:spMk id="2" creationId="{00000000-0000-0000-0000-000000000000}"/>
-          </ac:spMkLst>
-        </pc:spChg>
-        <pc:spChg chg="mod">
-          <ac:chgData name="Gerth Stølting Brodal" userId="04ef4784-6591-4f86-a140-f5c3b108582a" providerId="ADAL" clId="{9197687F-18F0-42D4-9B72-DE14A28EAE5C}" dt="2023-02-22T10:34:28.323" v="373" actId="1035"/>
-          <ac:spMkLst>
-            <pc:docMk/>
-            <pc:sldMk cId="930238539" sldId="595"/>
-            <ac:spMk id="80" creationId="{00000000-0000-0000-0000-000000000000}"/>
-          </ac:spMkLst>
-        </pc:spChg>
-        <pc:spChg chg="mod">
-          <ac:chgData name="Gerth Stølting Brodal" userId="04ef4784-6591-4f86-a140-f5c3b108582a" providerId="ADAL" clId="{9197687F-18F0-42D4-9B72-DE14A28EAE5C}" dt="2023-02-22T10:34:41.254" v="392" actId="1037"/>
-          <ac:spMkLst>
-            <pc:docMk/>
-            <pc:sldMk cId="930238539" sldId="595"/>
-            <ac:spMk id="81" creationId="{00000000-0000-0000-0000-000000000000}"/>
-          </ac:spMkLst>
-        </pc:spChg>
-        <pc:grpChg chg="mod">
-          <ac:chgData name="Gerth Stølting Brodal" userId="04ef4784-6591-4f86-a140-f5c3b108582a" providerId="ADAL" clId="{9197687F-18F0-42D4-9B72-DE14A28EAE5C}" dt="2023-02-22T10:34:28.323" v="373" actId="1035"/>
-          <ac:grpSpMkLst>
-            <pc:docMk/>
-            <pc:sldMk cId="930238539" sldId="595"/>
-            <ac:grpSpMk id="79" creationId="{00000000-0000-0000-0000-000000000000}"/>
-          </ac:grpSpMkLst>
-        </pc:grpChg>
-        <pc:graphicFrameChg chg="modGraphic">
-          <ac:chgData name="Gerth Stølting Brodal" userId="04ef4784-6591-4f86-a140-f5c3b108582a" providerId="ADAL" clId="{9197687F-18F0-42D4-9B72-DE14A28EAE5C}" dt="2023-02-22T10:33:59.482" v="344" actId="14100"/>
-          <ac:graphicFrameMkLst>
-            <pc:docMk/>
-            <pc:sldMk cId="930238539" sldId="595"/>
-            <ac:graphicFrameMk id="4" creationId="{00000000-0000-0000-0000-000000000000}"/>
-          </ac:graphicFrameMkLst>
-        </pc:graphicFrameChg>
       </pc:sldChg>
       <pc:sldChg chg="modSp mod">
         <pc:chgData name="Gerth Stølting Brodal" userId="04ef4784-6591-4f86-a140-f5c3b108582a" providerId="ADAL" clId="{9197687F-18F0-42D4-9B72-DE14A28EAE5C}" dt="2023-03-12T12:55:12.552" v="1459" actId="207"/>
@@ -508,14 +176,6 @@
           <pc:docMk/>
           <pc:sldMk cId="345092261" sldId="598"/>
         </pc:sldMkLst>
-        <pc:graphicFrameChg chg="modGraphic">
-          <ac:chgData name="Gerth Stølting Brodal" userId="04ef4784-6591-4f86-a140-f5c3b108582a" providerId="ADAL" clId="{9197687F-18F0-42D4-9B72-DE14A28EAE5C}" dt="2023-03-12T12:55:12.552" v="1459" actId="207"/>
-          <ac:graphicFrameMkLst>
-            <pc:docMk/>
-            <pc:sldMk cId="345092261" sldId="598"/>
-            <ac:graphicFrameMk id="4" creationId="{00000000-0000-0000-0000-000000000000}"/>
-          </ac:graphicFrameMkLst>
-        </pc:graphicFrameChg>
       </pc:sldChg>
       <pc:sldChg chg="addSp delSp modSp mod modAnim modNotesTx">
         <pc:chgData name="Gerth Stølting Brodal" userId="04ef4784-6591-4f86-a140-f5c3b108582a" providerId="ADAL" clId="{9197687F-18F0-42D4-9B72-DE14A28EAE5C}" dt="2023-03-12T12:18:57.373" v="1328" actId="1035"/>
@@ -523,246 +183,6 @@
           <pc:docMk/>
           <pc:sldMk cId="1220840155" sldId="606"/>
         </pc:sldMkLst>
-        <pc:spChg chg="mod">
-          <ac:chgData name="Gerth Stølting Brodal" userId="04ef4784-6591-4f86-a140-f5c3b108582a" providerId="ADAL" clId="{9197687F-18F0-42D4-9B72-DE14A28EAE5C}" dt="2023-03-12T12:08:50.778" v="665" actId="1076"/>
-          <ac:spMkLst>
-            <pc:docMk/>
-            <pc:sldMk cId="1220840155" sldId="606"/>
-            <ac:spMk id="2" creationId="{00000000-0000-0000-0000-000000000000}"/>
-          </ac:spMkLst>
-        </pc:spChg>
-        <pc:spChg chg="mod">
-          <ac:chgData name="Gerth Stølting Brodal" userId="04ef4784-6591-4f86-a140-f5c3b108582a" providerId="ADAL" clId="{9197687F-18F0-42D4-9B72-DE14A28EAE5C}" dt="2023-03-12T12:18:57.373" v="1328" actId="1035"/>
-          <ac:spMkLst>
-            <pc:docMk/>
-            <pc:sldMk cId="1220840155" sldId="606"/>
-            <ac:spMk id="8" creationId="{00000000-0000-0000-0000-000000000000}"/>
-          </ac:spMkLst>
-        </pc:spChg>
-        <pc:spChg chg="mod">
-          <ac:chgData name="Gerth Stølting Brodal" userId="04ef4784-6591-4f86-a140-f5c3b108582a" providerId="ADAL" clId="{9197687F-18F0-42D4-9B72-DE14A28EAE5C}" dt="2023-03-12T12:08:48.019" v="664" actId="1037"/>
-          <ac:spMkLst>
-            <pc:docMk/>
-            <pc:sldMk cId="1220840155" sldId="606"/>
-            <ac:spMk id="9" creationId="{00000000-0000-0000-0000-000000000000}"/>
-          </ac:spMkLst>
-        </pc:spChg>
-        <pc:spChg chg="add mod">
-          <ac:chgData name="Gerth Stølting Brodal" userId="04ef4784-6591-4f86-a140-f5c3b108582a" providerId="ADAL" clId="{9197687F-18F0-42D4-9B72-DE14A28EAE5C}" dt="2023-03-12T12:13:50.311" v="1282" actId="1035"/>
-          <ac:spMkLst>
-            <pc:docMk/>
-            <pc:sldMk cId="1220840155" sldId="606"/>
-            <ac:spMk id="18" creationId="{8D1D5184-0C00-6938-B81E-0C5FFAD29939}"/>
-          </ac:spMkLst>
-        </pc:spChg>
-        <pc:spChg chg="add mod">
-          <ac:chgData name="Gerth Stølting Brodal" userId="04ef4784-6591-4f86-a140-f5c3b108582a" providerId="ADAL" clId="{9197687F-18F0-42D4-9B72-DE14A28EAE5C}" dt="2023-03-12T12:11:42.842" v="846" actId="1036"/>
-          <ac:spMkLst>
-            <pc:docMk/>
-            <pc:sldMk cId="1220840155" sldId="606"/>
-            <ac:spMk id="19" creationId="{7968F901-48B5-CB67-7347-E429F43F22EA}"/>
-          </ac:spMkLst>
-        </pc:spChg>
-        <pc:spChg chg="add mod">
-          <ac:chgData name="Gerth Stølting Brodal" userId="04ef4784-6591-4f86-a140-f5c3b108582a" providerId="ADAL" clId="{9197687F-18F0-42D4-9B72-DE14A28EAE5C}" dt="2023-03-12T12:11:35.778" v="808" actId="1035"/>
-          <ac:spMkLst>
-            <pc:docMk/>
-            <pc:sldMk cId="1220840155" sldId="606"/>
-            <ac:spMk id="20" creationId="{8838C3B9-AADE-D63B-697D-4E45B535B8FC}"/>
-          </ac:spMkLst>
-        </pc:spChg>
-        <pc:spChg chg="add mod">
-          <ac:chgData name="Gerth Stølting Brodal" userId="04ef4784-6591-4f86-a140-f5c3b108582a" providerId="ADAL" clId="{9197687F-18F0-42D4-9B72-DE14A28EAE5C}" dt="2023-03-12T12:14:00.114" v="1285" actId="1036"/>
-          <ac:spMkLst>
-            <pc:docMk/>
-            <pc:sldMk cId="1220840155" sldId="606"/>
-            <ac:spMk id="21" creationId="{7AE58AD1-43A6-1F54-1977-A32C9793999A}"/>
-          </ac:spMkLst>
-        </pc:spChg>
-        <pc:spChg chg="add mod">
-          <ac:chgData name="Gerth Stølting Brodal" userId="04ef4784-6591-4f86-a140-f5c3b108582a" providerId="ADAL" clId="{9197687F-18F0-42D4-9B72-DE14A28EAE5C}" dt="2023-03-12T12:11:22.999" v="762" actId="1035"/>
-          <ac:spMkLst>
-            <pc:docMk/>
-            <pc:sldMk cId="1220840155" sldId="606"/>
-            <ac:spMk id="22" creationId="{CFE19717-7A93-FF85-6223-8CB3086F933F}"/>
-          </ac:spMkLst>
-        </pc:spChg>
-        <pc:spChg chg="mod">
-          <ac:chgData name="Gerth Stølting Brodal" userId="04ef4784-6591-4f86-a140-f5c3b108582a" providerId="ADAL" clId="{9197687F-18F0-42D4-9B72-DE14A28EAE5C}" dt="2023-03-12T12:09:07.862" v="667"/>
-          <ac:spMkLst>
-            <pc:docMk/>
-            <pc:sldMk cId="1220840155" sldId="606"/>
-            <ac:spMk id="24" creationId="{FAD0D07C-EFD3-4852-DB40-7BE03ECD38AA}"/>
-          </ac:spMkLst>
-        </pc:spChg>
-        <pc:spChg chg="mod">
-          <ac:chgData name="Gerth Stølting Brodal" userId="04ef4784-6591-4f86-a140-f5c3b108582a" providerId="ADAL" clId="{9197687F-18F0-42D4-9B72-DE14A28EAE5C}" dt="2023-03-12T12:09:07.862" v="667"/>
-          <ac:spMkLst>
-            <pc:docMk/>
-            <pc:sldMk cId="1220840155" sldId="606"/>
-            <ac:spMk id="25" creationId="{84116969-B436-AC74-8FA4-DEB548E716E4}"/>
-          </ac:spMkLst>
-        </pc:spChg>
-        <pc:spChg chg="mod">
-          <ac:chgData name="Gerth Stølting Brodal" userId="04ef4784-6591-4f86-a140-f5c3b108582a" providerId="ADAL" clId="{9197687F-18F0-42D4-9B72-DE14A28EAE5C}" dt="2023-03-12T12:09:07.862" v="667"/>
-          <ac:spMkLst>
-            <pc:docMk/>
-            <pc:sldMk cId="1220840155" sldId="606"/>
-            <ac:spMk id="26" creationId="{E8CE2A34-7D74-EF7F-CB7E-3BE9AED10AD2}"/>
-          </ac:spMkLst>
-        </pc:spChg>
-        <pc:spChg chg="mod">
-          <ac:chgData name="Gerth Stølting Brodal" userId="04ef4784-6591-4f86-a140-f5c3b108582a" providerId="ADAL" clId="{9197687F-18F0-42D4-9B72-DE14A28EAE5C}" dt="2023-03-12T12:12:01.076" v="881" actId="1035"/>
-          <ac:spMkLst>
-            <pc:docMk/>
-            <pc:sldMk cId="1220840155" sldId="606"/>
-            <ac:spMk id="27" creationId="{2B9E923D-62F8-9064-2199-01A8343F301E}"/>
-          </ac:spMkLst>
-        </pc:spChg>
-        <pc:spChg chg="mod">
-          <ac:chgData name="Gerth Stølting Brodal" userId="04ef4784-6591-4f86-a140-f5c3b108582a" providerId="ADAL" clId="{9197687F-18F0-42D4-9B72-DE14A28EAE5C}" dt="2023-03-12T12:09:07.862" v="667"/>
-          <ac:spMkLst>
-            <pc:docMk/>
-            <pc:sldMk cId="1220840155" sldId="606"/>
-            <ac:spMk id="28" creationId="{F268ECAA-87AB-E4D8-2C85-DBFB88D70D62}"/>
-          </ac:spMkLst>
-        </pc:spChg>
-        <pc:spChg chg="mod">
-          <ac:chgData name="Gerth Stølting Brodal" userId="04ef4784-6591-4f86-a140-f5c3b108582a" providerId="ADAL" clId="{9197687F-18F0-42D4-9B72-DE14A28EAE5C}" dt="2023-03-12T12:14:20.842" v="1299" actId="1036"/>
-          <ac:spMkLst>
-            <pc:docMk/>
-            <pc:sldMk cId="1220840155" sldId="606"/>
-            <ac:spMk id="30" creationId="{43B9E54F-0284-4A96-5123-870496AC4656}"/>
-          </ac:spMkLst>
-        </pc:spChg>
-        <pc:spChg chg="mod">
-          <ac:chgData name="Gerth Stølting Brodal" userId="04ef4784-6591-4f86-a140-f5c3b108582a" providerId="ADAL" clId="{9197687F-18F0-42D4-9B72-DE14A28EAE5C}" dt="2023-03-12T12:14:24.720" v="1300" actId="1037"/>
-          <ac:spMkLst>
-            <pc:docMk/>
-            <pc:sldMk cId="1220840155" sldId="606"/>
-            <ac:spMk id="31" creationId="{E6331490-728F-276F-BEE2-30DA2A391F6C}"/>
-          </ac:spMkLst>
-        </pc:spChg>
-        <pc:spChg chg="mod">
-          <ac:chgData name="Gerth Stølting Brodal" userId="04ef4784-6591-4f86-a140-f5c3b108582a" providerId="ADAL" clId="{9197687F-18F0-42D4-9B72-DE14A28EAE5C}" dt="2023-03-12T12:13:02.409" v="1079" actId="1037"/>
-          <ac:spMkLst>
-            <pc:docMk/>
-            <pc:sldMk cId="1220840155" sldId="606"/>
-            <ac:spMk id="32" creationId="{81C6D4D5-F851-A56D-5187-6647B0513855}"/>
-          </ac:spMkLst>
-        </pc:spChg>
-        <pc:spChg chg="mod">
-          <ac:chgData name="Gerth Stølting Brodal" userId="04ef4784-6591-4f86-a140-f5c3b108582a" providerId="ADAL" clId="{9197687F-18F0-42D4-9B72-DE14A28EAE5C}" dt="2023-03-12T12:12:53.640" v="1033" actId="1037"/>
-          <ac:spMkLst>
-            <pc:docMk/>
-            <pc:sldMk cId="1220840155" sldId="606"/>
-            <ac:spMk id="33" creationId="{62056A9F-68AB-33EA-F2F0-3A19A9A37752}"/>
-          </ac:spMkLst>
-        </pc:spChg>
-        <pc:spChg chg="mod">
-          <ac:chgData name="Gerth Stølting Brodal" userId="04ef4784-6591-4f86-a140-f5c3b108582a" providerId="ADAL" clId="{9197687F-18F0-42D4-9B72-DE14A28EAE5C}" dt="2023-03-12T12:13:10.829" v="1134" actId="1038"/>
-          <ac:spMkLst>
-            <pc:docMk/>
-            <pc:sldMk cId="1220840155" sldId="606"/>
-            <ac:spMk id="34" creationId="{3B544454-7884-9807-F7B5-887C11C398F2}"/>
-          </ac:spMkLst>
-        </pc:spChg>
-        <pc:spChg chg="add mod">
-          <ac:chgData name="Gerth Stølting Brodal" userId="04ef4784-6591-4f86-a140-f5c3b108582a" providerId="ADAL" clId="{9197687F-18F0-42D4-9B72-DE14A28EAE5C}" dt="2023-03-12T12:15:49.616" v="1318" actId="20577"/>
-          <ac:spMkLst>
-            <pc:docMk/>
-            <pc:sldMk cId="1220840155" sldId="606"/>
-            <ac:spMk id="36" creationId="{CD3190C1-BF03-65B4-0588-CD8D1B8827ED}"/>
-          </ac:spMkLst>
-        </pc:spChg>
-        <pc:grpChg chg="del mod">
-          <ac:chgData name="Gerth Stølting Brodal" userId="04ef4784-6591-4f86-a140-f5c3b108582a" providerId="ADAL" clId="{9197687F-18F0-42D4-9B72-DE14A28EAE5C}" dt="2023-03-12T12:13:38.918" v="1261" actId="478"/>
-          <ac:grpSpMkLst>
-            <pc:docMk/>
-            <pc:sldMk cId="1220840155" sldId="606"/>
-            <ac:grpSpMk id="10" creationId="{BDE896E9-67DA-4BF6-A480-25E4E3273B8B}"/>
-          </ac:grpSpMkLst>
-        </pc:grpChg>
-        <pc:grpChg chg="add mod">
-          <ac:chgData name="Gerth Stølting Brodal" userId="04ef4784-6591-4f86-a140-f5c3b108582a" providerId="ADAL" clId="{9197687F-18F0-42D4-9B72-DE14A28EAE5C}" dt="2023-03-12T12:12:07.254" v="905" actId="1036"/>
-          <ac:grpSpMkLst>
-            <pc:docMk/>
-            <pc:sldMk cId="1220840155" sldId="606"/>
-            <ac:grpSpMk id="23" creationId="{36CEAD96-9D62-1624-E0E3-E0380D0AB46F}"/>
-          </ac:grpSpMkLst>
-        </pc:grpChg>
-        <pc:grpChg chg="add mod">
-          <ac:chgData name="Gerth Stølting Brodal" userId="04ef4784-6591-4f86-a140-f5c3b108582a" providerId="ADAL" clId="{9197687F-18F0-42D4-9B72-DE14A28EAE5C}" dt="2023-03-12T12:14:11.981" v="1294" actId="1036"/>
-          <ac:grpSpMkLst>
-            <pc:docMk/>
-            <pc:sldMk cId="1220840155" sldId="606"/>
-            <ac:grpSpMk id="29" creationId="{03E1D210-3CF0-C9C7-FE43-5FAC6652BC07}"/>
-          </ac:grpSpMkLst>
-        </pc:grpChg>
-        <pc:graphicFrameChg chg="add mod">
-          <ac:chgData name="Gerth Stølting Brodal" userId="04ef4784-6591-4f86-a140-f5c3b108582a" providerId="ADAL" clId="{9197687F-18F0-42D4-9B72-DE14A28EAE5C}" dt="2023-02-22T08:26:22.986" v="32"/>
-          <ac:graphicFrameMkLst>
-            <pc:docMk/>
-            <pc:sldMk cId="1220840155" sldId="606"/>
-            <ac:graphicFrameMk id="3" creationId="{7362E841-AEEF-44FA-AE72-54DCD9AF3B7D}"/>
-          </ac:graphicFrameMkLst>
-        </pc:graphicFrameChg>
-        <pc:graphicFrameChg chg="mod modGraphic">
-          <ac:chgData name="Gerth Stølting Brodal" userId="04ef4784-6591-4f86-a140-f5c3b108582a" providerId="ADAL" clId="{9197687F-18F0-42D4-9B72-DE14A28EAE5C}" dt="2023-03-12T12:18:47.032" v="1322" actId="20577"/>
-          <ac:graphicFrameMkLst>
-            <pc:docMk/>
-            <pc:sldMk cId="1220840155" sldId="606"/>
-            <ac:graphicFrameMk id="4" creationId="{00000000-0000-0000-0000-000000000000}"/>
-          </ac:graphicFrameMkLst>
-        </pc:graphicFrameChg>
-        <pc:picChg chg="add mod">
-          <ac:chgData name="Gerth Stølting Brodal" userId="04ef4784-6591-4f86-a140-f5c3b108582a" providerId="ADAL" clId="{9197687F-18F0-42D4-9B72-DE14A28EAE5C}" dt="2023-03-12T12:13:50.311" v="1282" actId="1035"/>
-          <ac:picMkLst>
-            <pc:docMk/>
-            <pc:sldMk cId="1220840155" sldId="606"/>
-            <ac:picMk id="3" creationId="{3EB86994-CC7E-5907-4B27-9169C9B154B5}"/>
-          </ac:picMkLst>
-        </pc:picChg>
-        <pc:picChg chg="add mod">
-          <ac:chgData name="Gerth Stølting Brodal" userId="04ef4784-6591-4f86-a140-f5c3b108582a" providerId="ADAL" clId="{9197687F-18F0-42D4-9B72-DE14A28EAE5C}" dt="2023-03-12T12:11:42.842" v="846" actId="1036"/>
-          <ac:picMkLst>
-            <pc:docMk/>
-            <pc:sldMk cId="1220840155" sldId="606"/>
-            <ac:picMk id="5" creationId="{3736BDD6-D026-9035-B946-C90C5DE71E68}"/>
-          </ac:picMkLst>
-        </pc:picChg>
-        <pc:picChg chg="add mod">
-          <ac:chgData name="Gerth Stølting Brodal" userId="04ef4784-6591-4f86-a140-f5c3b108582a" providerId="ADAL" clId="{9197687F-18F0-42D4-9B72-DE14A28EAE5C}" dt="2023-03-12T12:11:35.778" v="808" actId="1035"/>
-          <ac:picMkLst>
-            <pc:docMk/>
-            <pc:sldMk cId="1220840155" sldId="606"/>
-            <ac:picMk id="6" creationId="{1AF5380C-AE1D-547E-2C81-E4F3617302A8}"/>
-          </ac:picMkLst>
-        </pc:picChg>
-        <pc:picChg chg="del mod">
-          <ac:chgData name="Gerth Stølting Brodal" userId="04ef4784-6591-4f86-a140-f5c3b108582a" providerId="ADAL" clId="{9197687F-18F0-42D4-9B72-DE14A28EAE5C}" dt="2023-03-12T12:13:31.832" v="1260" actId="478"/>
-          <ac:picMkLst>
-            <pc:docMk/>
-            <pc:sldMk cId="1220840155" sldId="606"/>
-            <ac:picMk id="7" creationId="{00000000-0000-0000-0000-000000000000}"/>
-          </ac:picMkLst>
-        </pc:picChg>
-        <pc:picChg chg="add mod">
-          <ac:chgData name="Gerth Stølting Brodal" userId="04ef4784-6591-4f86-a140-f5c3b108582a" providerId="ADAL" clId="{9197687F-18F0-42D4-9B72-DE14A28EAE5C}" dt="2023-03-12T12:14:00.114" v="1285" actId="1036"/>
-          <ac:picMkLst>
-            <pc:docMk/>
-            <pc:sldMk cId="1220840155" sldId="606"/>
-            <ac:picMk id="16" creationId="{90563BCC-3D90-389B-09FB-4553A3ED7F57}"/>
-          </ac:picMkLst>
-        </pc:picChg>
-        <pc:picChg chg="add mod">
-          <ac:chgData name="Gerth Stølting Brodal" userId="04ef4784-6591-4f86-a140-f5c3b108582a" providerId="ADAL" clId="{9197687F-18F0-42D4-9B72-DE14A28EAE5C}" dt="2023-03-12T12:11:22.999" v="762" actId="1035"/>
-          <ac:picMkLst>
-            <pc:docMk/>
-            <pc:sldMk cId="1220840155" sldId="606"/>
-            <ac:picMk id="17" creationId="{D43B16EC-1057-D885-A77A-BCD9CCE0CDC0}"/>
-          </ac:picMkLst>
-        </pc:picChg>
       </pc:sldChg>
       <pc:sldChg chg="addSp delSp add del mod">
         <pc:chgData name="Gerth Stølting Brodal" userId="04ef4784-6591-4f86-a140-f5c3b108582a" providerId="ADAL" clId="{9197687F-18F0-42D4-9B72-DE14A28EAE5C}" dt="2023-03-12T12:19:02.197" v="1329" actId="47"/>
@@ -770,14 +190,6 @@
           <pc:docMk/>
           <pc:sldMk cId="3107987302" sldId="607"/>
         </pc:sldMkLst>
-        <pc:spChg chg="add del">
-          <ac:chgData name="Gerth Stølting Brodal" userId="04ef4784-6591-4f86-a140-f5c3b108582a" providerId="ADAL" clId="{9197687F-18F0-42D4-9B72-DE14A28EAE5C}" dt="2023-03-12T12:15:31.217" v="1304" actId="22"/>
-          <ac:spMkLst>
-            <pc:docMk/>
-            <pc:sldMk cId="3107987302" sldId="607"/>
-            <ac:spMk id="7" creationId="{F28267A2-A99A-5AD0-90CD-3653031C980B}"/>
-          </ac:spMkLst>
-        </pc:spChg>
       </pc:sldChg>
       <pc:sldChg chg="addSp delSp modSp add mod delAnim modNotesTx">
         <pc:chgData name="Gerth Stølting Brodal" userId="04ef4784-6591-4f86-a140-f5c3b108582a" providerId="ADAL" clId="{9197687F-18F0-42D4-9B72-DE14A28EAE5C}" dt="2023-02-26T21:36:02.884" v="606" actId="20577"/>
@@ -785,118 +197,6 @@
           <pc:docMk/>
           <pc:sldMk cId="398569820" sldId="609"/>
         </pc:sldMkLst>
-        <pc:spChg chg="mod">
-          <ac:chgData name="Gerth Stølting Brodal" userId="04ef4784-6591-4f86-a140-f5c3b108582a" providerId="ADAL" clId="{9197687F-18F0-42D4-9B72-DE14A28EAE5C}" dt="2023-02-22T09:31:16.668" v="334" actId="20577"/>
-          <ac:spMkLst>
-            <pc:docMk/>
-            <pc:sldMk cId="398569820" sldId="609"/>
-            <ac:spMk id="2" creationId="{00000000-0000-0000-0000-000000000000}"/>
-          </ac:spMkLst>
-        </pc:spChg>
-        <pc:spChg chg="add mod">
-          <ac:chgData name="Gerth Stølting Brodal" userId="04ef4784-6591-4f86-a140-f5c3b108582a" providerId="ADAL" clId="{9197687F-18F0-42D4-9B72-DE14A28EAE5C}" dt="2023-02-22T09:02:23.828" v="84" actId="1076"/>
-          <ac:spMkLst>
-            <pc:docMk/>
-            <pc:sldMk cId="398569820" sldId="609"/>
-            <ac:spMk id="5" creationId="{2541C217-2EC0-DD57-6EEE-F934237B9178}"/>
-          </ac:spMkLst>
-        </pc:spChg>
-        <pc:spChg chg="del">
-          <ac:chgData name="Gerth Stølting Brodal" userId="04ef4784-6591-4f86-a140-f5c3b108582a" providerId="ADAL" clId="{9197687F-18F0-42D4-9B72-DE14A28EAE5C}" dt="2023-02-22T08:27:58.751" v="40" actId="478"/>
-          <ac:spMkLst>
-            <pc:docMk/>
-            <pc:sldMk cId="398569820" sldId="609"/>
-            <ac:spMk id="8" creationId="{00000000-0000-0000-0000-000000000000}"/>
-          </ac:spMkLst>
-        </pc:spChg>
-        <pc:spChg chg="del">
-          <ac:chgData name="Gerth Stølting Brodal" userId="04ef4784-6591-4f86-a140-f5c3b108582a" providerId="ADAL" clId="{9197687F-18F0-42D4-9B72-DE14A28EAE5C}" dt="2023-02-22T08:27:56.914" v="39" actId="478"/>
-          <ac:spMkLst>
-            <pc:docMk/>
-            <pc:sldMk cId="398569820" sldId="609"/>
-            <ac:spMk id="9" creationId="{00000000-0000-0000-0000-000000000000}"/>
-          </ac:spMkLst>
-        </pc:spChg>
-        <pc:spChg chg="add mod">
-          <ac:chgData name="Gerth Stølting Brodal" userId="04ef4784-6591-4f86-a140-f5c3b108582a" providerId="ADAL" clId="{9197687F-18F0-42D4-9B72-DE14A28EAE5C}" dt="2023-02-22T09:26:35.752" v="182" actId="1037"/>
-          <ac:spMkLst>
-            <pc:docMk/>
-            <pc:sldMk cId="398569820" sldId="609"/>
-            <ac:spMk id="21" creationId="{1C11BD08-50AA-9CA2-657B-6D921A637146}"/>
-          </ac:spMkLst>
-        </pc:spChg>
-        <pc:spChg chg="add mod">
-          <ac:chgData name="Gerth Stølting Brodal" userId="04ef4784-6591-4f86-a140-f5c3b108582a" providerId="ADAL" clId="{9197687F-18F0-42D4-9B72-DE14A28EAE5C}" dt="2023-02-22T09:23:53.446" v="145" actId="1038"/>
-          <ac:spMkLst>
-            <pc:docMk/>
-            <pc:sldMk cId="398569820" sldId="609"/>
-            <ac:spMk id="22" creationId="{4FFDE4CD-FE19-AD67-DE79-062811FC6D9E}"/>
-          </ac:spMkLst>
-        </pc:spChg>
-        <pc:spChg chg="add mod">
-          <ac:chgData name="Gerth Stølting Brodal" userId="04ef4784-6591-4f86-a140-f5c3b108582a" providerId="ADAL" clId="{9197687F-18F0-42D4-9B72-DE14A28EAE5C}" dt="2023-02-22T09:26:32.379" v="178" actId="1035"/>
-          <ac:spMkLst>
-            <pc:docMk/>
-            <pc:sldMk cId="398569820" sldId="609"/>
-            <ac:spMk id="23" creationId="{EE91BB49-DC71-D43F-A921-10D69472B25C}"/>
-          </ac:spMkLst>
-        </pc:spChg>
-        <pc:grpChg chg="del mod">
-          <ac:chgData name="Gerth Stølting Brodal" userId="04ef4784-6591-4f86-a140-f5c3b108582a" providerId="ADAL" clId="{9197687F-18F0-42D4-9B72-DE14A28EAE5C}" dt="2023-02-22T09:23:01.298" v="114" actId="478"/>
-          <ac:grpSpMkLst>
-            <pc:docMk/>
-            <pc:sldMk cId="398569820" sldId="609"/>
-            <ac:grpSpMk id="10" creationId="{BDE896E9-67DA-4BF6-A480-25E4E3273B8B}"/>
-          </ac:grpSpMkLst>
-        </pc:grpChg>
-        <pc:graphicFrameChg chg="mod modGraphic">
-          <ac:chgData name="Gerth Stølting Brodal" userId="04ef4784-6591-4f86-a140-f5c3b108582a" providerId="ADAL" clId="{9197687F-18F0-42D4-9B72-DE14A28EAE5C}" dt="2023-02-26T21:36:02.884" v="606" actId="20577"/>
-          <ac:graphicFrameMkLst>
-            <pc:docMk/>
-            <pc:sldMk cId="398569820" sldId="609"/>
-            <ac:graphicFrameMk id="4" creationId="{00000000-0000-0000-0000-000000000000}"/>
-          </ac:graphicFrameMkLst>
-        </pc:graphicFrameChg>
-        <pc:picChg chg="del">
-          <ac:chgData name="Gerth Stølting Brodal" userId="04ef4784-6591-4f86-a140-f5c3b108582a" providerId="ADAL" clId="{9197687F-18F0-42D4-9B72-DE14A28EAE5C}" dt="2023-02-22T09:03:58.625" v="91" actId="478"/>
-          <ac:picMkLst>
-            <pc:docMk/>
-            <pc:sldMk cId="398569820" sldId="609"/>
-            <ac:picMk id="7" creationId="{00000000-0000-0000-0000-000000000000}"/>
-          </ac:picMkLst>
-        </pc:picChg>
-        <pc:picChg chg="add del mod">
-          <ac:chgData name="Gerth Stølting Brodal" userId="04ef4784-6591-4f86-a140-f5c3b108582a" providerId="ADAL" clId="{9197687F-18F0-42D4-9B72-DE14A28EAE5C}" dt="2023-02-22T09:05:31.798" v="99" actId="478"/>
-          <ac:picMkLst>
-            <pc:docMk/>
-            <pc:sldMk cId="398569820" sldId="609"/>
-            <ac:picMk id="16" creationId="{8747843A-8FAB-81C9-56AD-50D1038BCA13}"/>
-          </ac:picMkLst>
-        </pc:picChg>
-        <pc:picChg chg="add del mod">
-          <ac:chgData name="Gerth Stølting Brodal" userId="04ef4784-6591-4f86-a140-f5c3b108582a" providerId="ADAL" clId="{9197687F-18F0-42D4-9B72-DE14A28EAE5C}" dt="2023-02-22T09:22:49.817" v="111" actId="478"/>
-          <ac:picMkLst>
-            <pc:docMk/>
-            <pc:sldMk cId="398569820" sldId="609"/>
-            <ac:picMk id="18" creationId="{7E4FFE26-5496-FF32-75FF-5533AA57AAC6}"/>
-          </ac:picMkLst>
-        </pc:picChg>
-        <pc:picChg chg="add del mod">
-          <ac:chgData name="Gerth Stølting Brodal" userId="04ef4784-6591-4f86-a140-f5c3b108582a" providerId="ADAL" clId="{9197687F-18F0-42D4-9B72-DE14A28EAE5C}" dt="2023-02-22T09:25:37.925" v="160" actId="478"/>
-          <ac:picMkLst>
-            <pc:docMk/>
-            <pc:sldMk cId="398569820" sldId="609"/>
-            <ac:picMk id="20" creationId="{239C1094-BFA8-7E26-7C51-DEC84B2278C9}"/>
-          </ac:picMkLst>
-        </pc:picChg>
-        <pc:picChg chg="add mod ord">
-          <ac:chgData name="Gerth Stølting Brodal" userId="04ef4784-6591-4f86-a140-f5c3b108582a" providerId="ADAL" clId="{9197687F-18F0-42D4-9B72-DE14A28EAE5C}" dt="2023-02-22T09:26:19.244" v="173" actId="1076"/>
-          <ac:picMkLst>
-            <pc:docMk/>
-            <pc:sldMk cId="398569820" sldId="609"/>
-            <ac:picMk id="25" creationId="{120A0AC3-F8A0-3764-F5E9-C62D222FC5B3}"/>
-          </ac:picMkLst>
-        </pc:picChg>
       </pc:sldChg>
       <pc:sldChg chg="addSp delSp modSp new mod modAnim modNotesTx">
         <pc:chgData name="Gerth Stølting Brodal" userId="04ef4784-6591-4f86-a140-f5c3b108582a" providerId="ADAL" clId="{9197687F-18F0-42D4-9B72-DE14A28EAE5C}" dt="2023-03-13T07:46:31.855" v="2459" actId="20577"/>
@@ -904,232 +204,6 @@
           <pc:docMk/>
           <pc:sldMk cId="3874947569" sldId="610"/>
         </pc:sldMkLst>
-        <pc:spChg chg="mod">
-          <ac:chgData name="Gerth Stølting Brodal" userId="04ef4784-6591-4f86-a140-f5c3b108582a" providerId="ADAL" clId="{9197687F-18F0-42D4-9B72-DE14A28EAE5C}" dt="2023-03-12T13:44:45.478" v="2190" actId="6549"/>
-          <ac:spMkLst>
-            <pc:docMk/>
-            <pc:sldMk cId="3874947569" sldId="610"/>
-            <ac:spMk id="2" creationId="{8A7D887A-477E-5547-4340-E05CE57BD2FF}"/>
-          </ac:spMkLst>
-        </pc:spChg>
-        <pc:spChg chg="del">
-          <ac:chgData name="Gerth Stølting Brodal" userId="04ef4784-6591-4f86-a140-f5c3b108582a" providerId="ADAL" clId="{9197687F-18F0-42D4-9B72-DE14A28EAE5C}" dt="2023-03-12T12:47:58.595" v="1387" actId="478"/>
-          <ac:spMkLst>
-            <pc:docMk/>
-            <pc:sldMk cId="3874947569" sldId="610"/>
-            <ac:spMk id="3" creationId="{A76ED7C7-63E7-F03A-5B11-27548D1E1D96}"/>
-          </ac:spMkLst>
-        </pc:spChg>
-        <pc:spChg chg="add del mod">
-          <ac:chgData name="Gerth Stølting Brodal" userId="04ef4784-6591-4f86-a140-f5c3b108582a" providerId="ADAL" clId="{9197687F-18F0-42D4-9B72-DE14A28EAE5C}" dt="2023-03-12T13:04:59.102" v="1516" actId="478"/>
-          <ac:spMkLst>
-            <pc:docMk/>
-            <pc:sldMk cId="3874947569" sldId="610"/>
-            <ac:spMk id="5" creationId="{ABCCF17E-0B44-A779-88CD-A049D9DE7990}"/>
-          </ac:spMkLst>
-        </pc:spChg>
-        <pc:spChg chg="add mod">
-          <ac:chgData name="Gerth Stølting Brodal" userId="04ef4784-6591-4f86-a140-f5c3b108582a" providerId="ADAL" clId="{9197687F-18F0-42D4-9B72-DE14A28EAE5C}" dt="2023-03-13T07:46:31.855" v="2459" actId="20577"/>
-          <ac:spMkLst>
-            <pc:docMk/>
-            <pc:sldMk cId="3874947569" sldId="610"/>
-            <ac:spMk id="5" creationId="{C1A056DD-7942-DC13-82F0-C8F8674A5A1E}"/>
-          </ac:spMkLst>
-        </pc:spChg>
-        <pc:spChg chg="add del mod">
-          <ac:chgData name="Gerth Stølting Brodal" userId="04ef4784-6591-4f86-a140-f5c3b108582a" providerId="ADAL" clId="{9197687F-18F0-42D4-9B72-DE14A28EAE5C}" dt="2023-03-12T13:33:19.845" v="2097" actId="403"/>
-          <ac:spMkLst>
-            <pc:docMk/>
-            <pc:sldMk cId="3874947569" sldId="610"/>
-            <ac:spMk id="7" creationId="{466F199C-B196-A43F-39AB-8BD5282B5F33}"/>
-          </ac:spMkLst>
-        </pc:spChg>
-        <pc:spChg chg="add del mod">
-          <ac:chgData name="Gerth Stølting Brodal" userId="04ef4784-6591-4f86-a140-f5c3b108582a" providerId="ADAL" clId="{9197687F-18F0-42D4-9B72-DE14A28EAE5C}" dt="2023-03-12T13:05:10.078" v="1521"/>
-          <ac:spMkLst>
-            <pc:docMk/>
-            <pc:sldMk cId="3874947569" sldId="610"/>
-            <ac:spMk id="8" creationId="{5F1919F6-67BA-401A-CB3F-68CC72326325}"/>
-          </ac:spMkLst>
-        </pc:spChg>
-        <pc:graphicFrameChg chg="add mod modGraphic">
-          <ac:chgData name="Gerth Stølting Brodal" userId="04ef4784-6591-4f86-a140-f5c3b108582a" providerId="ADAL" clId="{9197687F-18F0-42D4-9B72-DE14A28EAE5C}" dt="2023-03-13T07:46:04.120" v="2445" actId="1076"/>
-          <ac:graphicFrameMkLst>
-            <pc:docMk/>
-            <pc:sldMk cId="3874947569" sldId="610"/>
-            <ac:graphicFrameMk id="4" creationId="{565B82F5-449A-5B10-740F-0B39EBF86426}"/>
-          </ac:graphicFrameMkLst>
-        </pc:graphicFrameChg>
-      </pc:sldChg>
-    </pc:docChg>
-  </pc:docChgLst>
-  <pc:docChgLst>
-    <pc:chgData name="Gerth Stølting Brodal" userId="04ef4784-6591-4f86-a140-f5c3b108582a" providerId="ADAL" clId="{1F324BB6-B43F-4994-A32E-C009FE83786F}"/>
-    <pc:docChg chg="undo custSel modSld">
-      <pc:chgData name="Gerth Stølting Brodal" userId="04ef4784-6591-4f86-a140-f5c3b108582a" providerId="ADAL" clId="{1F324BB6-B43F-4994-A32E-C009FE83786F}" dt="2021-02-25T21:48:23.855" v="336" actId="20577"/>
-      <pc:docMkLst>
-        <pc:docMk/>
-      </pc:docMkLst>
-      <pc:sldChg chg="modNotesTx">
-        <pc:chgData name="Gerth Stølting Brodal" userId="04ef4784-6591-4f86-a140-f5c3b108582a" providerId="ADAL" clId="{1F324BB6-B43F-4994-A32E-C009FE83786F}" dt="2021-02-25T21:48:23.855" v="336" actId="20577"/>
-        <pc:sldMkLst>
-          <pc:docMk/>
-          <pc:sldMk cId="567584679" sldId="587"/>
-        </pc:sldMkLst>
-      </pc:sldChg>
-      <pc:sldChg chg="modSp">
-        <pc:chgData name="Gerth Stølting Brodal" userId="04ef4784-6591-4f86-a140-f5c3b108582a" providerId="ADAL" clId="{1F324BB6-B43F-4994-A32E-C009FE83786F}" dt="2021-02-25T21:32:18.494" v="135" actId="20577"/>
-        <pc:sldMkLst>
-          <pc:docMk/>
-          <pc:sldMk cId="3354709852" sldId="593"/>
-        </pc:sldMkLst>
-        <pc:spChg chg="mod">
-          <ac:chgData name="Gerth Stølting Brodal" userId="04ef4784-6591-4f86-a140-f5c3b108582a" providerId="ADAL" clId="{1F324BB6-B43F-4994-A32E-C009FE83786F}" dt="2021-02-25T21:32:18.494" v="135" actId="20577"/>
-          <ac:spMkLst>
-            <pc:docMk/>
-            <pc:sldMk cId="3354709852" sldId="593"/>
-            <ac:spMk id="3" creationId="{00000000-0000-0000-0000-000000000000}"/>
-          </ac:spMkLst>
-        </pc:spChg>
-      </pc:sldChg>
-      <pc:sldChg chg="addSp modSp mod modAnim">
-        <pc:chgData name="Gerth Stølting Brodal" userId="04ef4784-6591-4f86-a140-f5c3b108582a" providerId="ADAL" clId="{1F324BB6-B43F-4994-A32E-C009FE83786F}" dt="2021-02-25T21:19:54.304" v="129"/>
-        <pc:sldMkLst>
-          <pc:docMk/>
-          <pc:sldMk cId="345092261" sldId="598"/>
-        </pc:sldMkLst>
-        <pc:spChg chg="add mod">
-          <ac:chgData name="Gerth Stølting Brodal" userId="04ef4784-6591-4f86-a140-f5c3b108582a" providerId="ADAL" clId="{1F324BB6-B43F-4994-A32E-C009FE83786F}" dt="2021-02-25T21:19:47.928" v="128" actId="1076"/>
-          <ac:spMkLst>
-            <pc:docMk/>
-            <pc:sldMk cId="345092261" sldId="598"/>
-            <ac:spMk id="3" creationId="{C46E9671-7052-4F22-AFFE-4B31A74DBB92}"/>
-          </ac:spMkLst>
-        </pc:spChg>
-        <pc:spChg chg="add mod">
-          <ac:chgData name="Gerth Stølting Brodal" userId="04ef4784-6591-4f86-a140-f5c3b108582a" providerId="ADAL" clId="{1F324BB6-B43F-4994-A32E-C009FE83786F}" dt="2021-02-25T21:19:40.022" v="127" actId="571"/>
-          <ac:spMkLst>
-            <pc:docMk/>
-            <pc:sldMk cId="345092261" sldId="598"/>
-            <ac:spMk id="7" creationId="{A13F79F4-1122-4BD8-ABEA-5F753924411C}"/>
-          </ac:spMkLst>
-        </pc:spChg>
-      </pc:sldChg>
-      <pc:sldChg chg="addSp delSp modSp mod modAnim">
-        <pc:chgData name="Gerth Stølting Brodal" userId="04ef4784-6591-4f86-a140-f5c3b108582a" providerId="ADAL" clId="{1F324BB6-B43F-4994-A32E-C009FE83786F}" dt="2021-02-25T19:30:51.449" v="64" actId="1076"/>
-        <pc:sldMkLst>
-          <pc:docMk/>
-          <pc:sldMk cId="3608860866" sldId="599"/>
-        </pc:sldMkLst>
-        <pc:spChg chg="add del mod">
-          <ac:chgData name="Gerth Stølting Brodal" userId="04ef4784-6591-4f86-a140-f5c3b108582a" providerId="ADAL" clId="{1F324BB6-B43F-4994-A32E-C009FE83786F}" dt="2021-02-25T19:27:15.876" v="1"/>
-          <ac:spMkLst>
-            <pc:docMk/>
-            <pc:sldMk cId="3608860866" sldId="599"/>
-            <ac:spMk id="7" creationId="{1F1ACDC4-40F8-4156-8D9B-8BF61627A8B4}"/>
-          </ac:spMkLst>
-        </pc:spChg>
-        <pc:spChg chg="add del mod">
-          <ac:chgData name="Gerth Stølting Brodal" userId="04ef4784-6591-4f86-a140-f5c3b108582a" providerId="ADAL" clId="{1F324BB6-B43F-4994-A32E-C009FE83786F}" dt="2021-02-25T19:27:57.946" v="8"/>
-          <ac:spMkLst>
-            <pc:docMk/>
-            <pc:sldMk cId="3608860866" sldId="599"/>
-            <ac:spMk id="8" creationId="{522DA59D-99F7-433E-A4C6-357A6A786636}"/>
-          </ac:spMkLst>
-        </pc:spChg>
-        <pc:graphicFrameChg chg="add mod modGraphic">
-          <ac:chgData name="Gerth Stølting Brodal" userId="04ef4784-6591-4f86-a140-f5c3b108582a" providerId="ADAL" clId="{1F324BB6-B43F-4994-A32E-C009FE83786F}" dt="2021-02-25T19:30:51.449" v="64" actId="1076"/>
-          <ac:graphicFrameMkLst>
-            <pc:docMk/>
-            <pc:sldMk cId="3608860866" sldId="599"/>
-            <ac:graphicFrameMk id="9" creationId="{4A9AFBE2-ED33-413C-B3AB-4F117126A0AF}"/>
-          </ac:graphicFrameMkLst>
-        </pc:graphicFrameChg>
-      </pc:sldChg>
-      <pc:sldChg chg="addSp modSp mod">
-        <pc:chgData name="Gerth Stølting Brodal" userId="04ef4784-6591-4f86-a140-f5c3b108582a" providerId="ADAL" clId="{1F324BB6-B43F-4994-A32E-C009FE83786F}" dt="2021-02-25T21:39:51.129" v="285" actId="1076"/>
-        <pc:sldMkLst>
-          <pc:docMk/>
-          <pc:sldMk cId="2518119805" sldId="601"/>
-        </pc:sldMkLst>
-        <pc:spChg chg="add mod">
-          <ac:chgData name="Gerth Stølting Brodal" userId="04ef4784-6591-4f86-a140-f5c3b108582a" providerId="ADAL" clId="{1F324BB6-B43F-4994-A32E-C009FE83786F}" dt="2021-02-25T21:39:51.129" v="285" actId="1076"/>
-          <ac:spMkLst>
-            <pc:docMk/>
-            <pc:sldMk cId="2518119805" sldId="601"/>
-            <ac:spMk id="5" creationId="{EC500E2C-2DBB-4718-912E-C47C1F4AD9E1}"/>
-          </ac:spMkLst>
-        </pc:spChg>
-      </pc:sldChg>
-      <pc:sldChg chg="addSp modSp mod modAnim">
-        <pc:chgData name="Gerth Stølting Brodal" userId="04ef4784-6591-4f86-a140-f5c3b108582a" providerId="ADAL" clId="{1F324BB6-B43F-4994-A32E-C009FE83786F}" dt="2021-02-25T20:00:17.712" v="114" actId="1035"/>
-        <pc:sldMkLst>
-          <pc:docMk/>
-          <pc:sldMk cId="1220840155" sldId="606"/>
-        </pc:sldMkLst>
-        <pc:spChg chg="mod">
-          <ac:chgData name="Gerth Stølting Brodal" userId="04ef4784-6591-4f86-a140-f5c3b108582a" providerId="ADAL" clId="{1F324BB6-B43F-4994-A32E-C009FE83786F}" dt="2021-02-25T19:57:32.025" v="87" actId="1036"/>
-          <ac:spMkLst>
-            <pc:docMk/>
-            <pc:sldMk cId="1220840155" sldId="606"/>
-            <ac:spMk id="11" creationId="{82C487F2-6355-4B77-AF2A-8C818637B87D}"/>
-          </ac:spMkLst>
-        </pc:spChg>
-        <pc:spChg chg="mod">
-          <ac:chgData name="Gerth Stølting Brodal" userId="04ef4784-6591-4f86-a140-f5c3b108582a" providerId="ADAL" clId="{1F324BB6-B43F-4994-A32E-C009FE83786F}" dt="2021-02-25T19:57:38.892" v="91" actId="1035"/>
-          <ac:spMkLst>
-            <pc:docMk/>
-            <pc:sldMk cId="1220840155" sldId="606"/>
-            <ac:spMk id="12" creationId="{4970697C-7C6C-4D71-8F07-939FCCFC48E4}"/>
-          </ac:spMkLst>
-        </pc:spChg>
-        <pc:spChg chg="mod">
-          <ac:chgData name="Gerth Stølting Brodal" userId="04ef4784-6591-4f86-a140-f5c3b108582a" providerId="ADAL" clId="{1F324BB6-B43F-4994-A32E-C009FE83786F}" dt="2021-02-25T20:00:17.712" v="114" actId="1035"/>
-          <ac:spMkLst>
-            <pc:docMk/>
-            <pc:sldMk cId="1220840155" sldId="606"/>
-            <ac:spMk id="13" creationId="{563CC9C7-E5C7-4D47-B82F-7E6D2BF9C4EE}"/>
-          </ac:spMkLst>
-        </pc:spChg>
-        <pc:spChg chg="mod">
-          <ac:chgData name="Gerth Stølting Brodal" userId="04ef4784-6591-4f86-a140-f5c3b108582a" providerId="ADAL" clId="{1F324BB6-B43F-4994-A32E-C009FE83786F}" dt="2021-02-25T19:57:53.607" v="100" actId="1036"/>
-          <ac:spMkLst>
-            <pc:docMk/>
-            <pc:sldMk cId="1220840155" sldId="606"/>
-            <ac:spMk id="14" creationId="{033EE1FA-4FDB-4546-9494-30CF3185FFD2}"/>
-          </ac:spMkLst>
-        </pc:spChg>
-        <pc:spChg chg="mod">
-          <ac:chgData name="Gerth Stølting Brodal" userId="04ef4784-6591-4f86-a140-f5c3b108582a" providerId="ADAL" clId="{1F324BB6-B43F-4994-A32E-C009FE83786F}" dt="2021-02-25T20:00:10.984" v="111" actId="1035"/>
-          <ac:spMkLst>
-            <pc:docMk/>
-            <pc:sldMk cId="1220840155" sldId="606"/>
-            <ac:spMk id="15" creationId="{128DA2F3-3A35-45F2-A76B-37AF84D9992D}"/>
-          </ac:spMkLst>
-        </pc:spChg>
-        <pc:grpChg chg="add mod">
-          <ac:chgData name="Gerth Stølting Brodal" userId="04ef4784-6591-4f86-a140-f5c3b108582a" providerId="ADAL" clId="{1F324BB6-B43F-4994-A32E-C009FE83786F}" dt="2021-02-25T19:51:48.478" v="68" actId="1076"/>
-          <ac:grpSpMkLst>
-            <pc:docMk/>
-            <pc:sldMk cId="1220840155" sldId="606"/>
-            <ac:grpSpMk id="10" creationId="{BDE896E9-67DA-4BF6-A480-25E4E3273B8B}"/>
-          </ac:grpSpMkLst>
-        </pc:grpChg>
-      </pc:sldChg>
-      <pc:sldChg chg="modSp mod">
-        <pc:chgData name="Gerth Stølting Brodal" userId="04ef4784-6591-4f86-a140-f5c3b108582a" providerId="ADAL" clId="{1F324BB6-B43F-4994-A32E-C009FE83786F}" dt="2021-02-25T19:51:37.967" v="66" actId="1076"/>
-        <pc:sldMkLst>
-          <pc:docMk/>
-          <pc:sldMk cId="3107987302" sldId="607"/>
-        </pc:sldMkLst>
-        <pc:grpChg chg="mod">
-          <ac:chgData name="Gerth Stølting Brodal" userId="04ef4784-6591-4f86-a140-f5c3b108582a" providerId="ADAL" clId="{1F324BB6-B43F-4994-A32E-C009FE83786F}" dt="2021-02-25T19:51:37.967" v="66" actId="1076"/>
-          <ac:grpSpMkLst>
-            <pc:docMk/>
-            <pc:sldMk cId="3107987302" sldId="607"/>
-            <ac:grpSpMk id="22" creationId="{00000000-0000-0000-0000-000000000000}"/>
-          </ac:grpSpMkLst>
-        </pc:grpChg>
       </pc:sldChg>
     </pc:docChg>
   </pc:docChgLst>
@@ -1160,20 +234,224 @@
           <pc:docMk/>
           <pc:sldMk cId="1045497289" sldId="602"/>
         </pc:sldMkLst>
-        <pc:spChg chg="add mod">
-          <ac:chgData name="Gerth Stølting Brodal" userId="04ef4784-6591-4f86-a140-f5c3b108582a" providerId="ADAL" clId="{326A0C18-D6A9-4FD3-B28F-B5526EB98DFC}" dt="2022-02-22T22:24:09.065" v="2" actId="1076"/>
-          <ac:spMkLst>
-            <pc:docMk/>
-            <pc:sldMk cId="1045497289" sldId="602"/>
-            <ac:spMk id="6" creationId="{75B12BBD-3B40-4DDA-BECE-F7ECC213EEB2}"/>
-          </ac:spMkLst>
-        </pc:spChg>
       </pc:sldChg>
       <pc:sldChg chg="modNotesTx">
         <pc:chgData name="Gerth Stølting Brodal" userId="04ef4784-6591-4f86-a140-f5c3b108582a" providerId="ADAL" clId="{326A0C18-D6A9-4FD3-B28F-B5526EB98DFC}" dt="2022-02-22T22:30:56.835" v="169" actId="20577"/>
         <pc:sldMkLst>
           <pc:docMk/>
           <pc:sldMk cId="2526829614" sldId="605"/>
+        </pc:sldMkLst>
+      </pc:sldChg>
+    </pc:docChg>
+  </pc:docChgLst>
+  <pc:docChgLst>
+    <pc:chgData name="Gerth Stølting Brodal" userId="04ef4784-6591-4f86-a140-f5c3b108582a" providerId="ADAL" clId="{15423D16-B30F-4DAE-B86A-7A9C21301905}"/>
+    <pc:docChg chg="undo custSel modSld">
+      <pc:chgData name="Gerth Stølting Brodal" userId="04ef4784-6591-4f86-a140-f5c3b108582a" providerId="ADAL" clId="{15423D16-B30F-4DAE-B86A-7A9C21301905}" dt="2025-02-23T19:49:46.719" v="127" actId="20577"/>
+      <pc:docMkLst>
+        <pc:docMk/>
+      </pc:docMkLst>
+      <pc:sldChg chg="modNotesTx">
+        <pc:chgData name="Gerth Stølting Brodal" userId="04ef4784-6591-4f86-a140-f5c3b108582a" providerId="ADAL" clId="{15423D16-B30F-4DAE-B86A-7A9C21301905}" dt="2025-02-23T19:30:48.235" v="54" actId="20577"/>
+        <pc:sldMkLst>
+          <pc:docMk/>
+          <pc:sldMk cId="3149368856" sldId="596"/>
+        </pc:sldMkLst>
+      </pc:sldChg>
+      <pc:sldChg chg="modNotesTx">
+        <pc:chgData name="Gerth Stølting Brodal" userId="04ef4784-6591-4f86-a140-f5c3b108582a" providerId="ADAL" clId="{15423D16-B30F-4DAE-B86A-7A9C21301905}" dt="2025-02-23T19:49:46.719" v="127" actId="20577"/>
+        <pc:sldMkLst>
+          <pc:docMk/>
+          <pc:sldMk cId="398569820" sldId="609"/>
+        </pc:sldMkLst>
+      </pc:sldChg>
+      <pc:sldChg chg="modSp mod">
+        <pc:chgData name="Gerth Stølting Brodal" userId="04ef4784-6591-4f86-a140-f5c3b108582a" providerId="ADAL" clId="{15423D16-B30F-4DAE-B86A-7A9C21301905}" dt="2025-02-23T19:37:00.902" v="55" actId="20577"/>
+        <pc:sldMkLst>
+          <pc:docMk/>
+          <pc:sldMk cId="3874947569" sldId="610"/>
+        </pc:sldMkLst>
+        <pc:spChg chg="mod">
+          <ac:chgData name="Gerth Stølting Brodal" userId="04ef4784-6591-4f86-a140-f5c3b108582a" providerId="ADAL" clId="{15423D16-B30F-4DAE-B86A-7A9C21301905}" dt="2025-02-23T19:37:00.902" v="55" actId="20577"/>
+          <ac:spMkLst>
+            <pc:docMk/>
+            <pc:sldMk cId="3874947569" sldId="610"/>
+            <ac:spMk id="5" creationId="{C1A056DD-7942-DC13-82F0-C8F8674A5A1E}"/>
+          </ac:spMkLst>
+        </pc:spChg>
+      </pc:sldChg>
+    </pc:docChg>
+  </pc:docChgLst>
+  <pc:docChgLst>
+    <pc:chgData name="Gerth Stølting Brodal" userId="04ef4784-6591-4f86-a140-f5c3b108582a" providerId="ADAL" clId="{1469466D-464E-4DC8-B62D-B95481E21BC1}"/>
+    <pc:docChg chg="undo custSel addSld delSld modSld">
+      <pc:chgData name="Gerth Stølting Brodal" userId="04ef4784-6591-4f86-a140-f5c3b108582a" providerId="ADAL" clId="{1469466D-464E-4DC8-B62D-B95481E21BC1}" dt="2022-04-06T04:59:21.138" v="837" actId="20577"/>
+      <pc:docMkLst>
+        <pc:docMk/>
+      </pc:docMkLst>
+      <pc:sldChg chg="modSp mod">
+        <pc:chgData name="Gerth Stølting Brodal" userId="04ef4784-6591-4f86-a140-f5c3b108582a" providerId="ADAL" clId="{1469466D-464E-4DC8-B62D-B95481E21BC1}" dt="2022-04-05T19:48:08.321" v="190" actId="20577"/>
+        <pc:sldMkLst>
+          <pc:docMk/>
+          <pc:sldMk cId="1177245852" sldId="590"/>
+        </pc:sldMkLst>
+      </pc:sldChg>
+      <pc:sldChg chg="modSp mod">
+        <pc:chgData name="Gerth Stølting Brodal" userId="04ef4784-6591-4f86-a140-f5c3b108582a" providerId="ADAL" clId="{1469466D-464E-4DC8-B62D-B95481E21BC1}" dt="2022-04-05T19:48:23.681" v="192" actId="20577"/>
+        <pc:sldMkLst>
+          <pc:docMk/>
+          <pc:sldMk cId="1526489455" sldId="592"/>
+        </pc:sldMkLst>
+      </pc:sldChg>
+      <pc:sldChg chg="modSp mod">
+        <pc:chgData name="Gerth Stølting Brodal" userId="04ef4784-6591-4f86-a140-f5c3b108582a" providerId="ADAL" clId="{1469466D-464E-4DC8-B62D-B95481E21BC1}" dt="2022-04-05T19:48:28.682" v="193" actId="6549"/>
+        <pc:sldMkLst>
+          <pc:docMk/>
+          <pc:sldMk cId="3354709852" sldId="593"/>
+        </pc:sldMkLst>
+      </pc:sldChg>
+      <pc:sldChg chg="modSp mod">
+        <pc:chgData name="Gerth Stølting Brodal" userId="04ef4784-6591-4f86-a140-f5c3b108582a" providerId="ADAL" clId="{1469466D-464E-4DC8-B62D-B95481E21BC1}" dt="2022-04-05T19:48:34.575" v="194" actId="20577"/>
+        <pc:sldMkLst>
+          <pc:docMk/>
+          <pc:sldMk cId="3608860866" sldId="599"/>
+        </pc:sldMkLst>
+      </pc:sldChg>
+      <pc:sldChg chg="del">
+        <pc:chgData name="Gerth Stølting Brodal" userId="04ef4784-6591-4f86-a140-f5c3b108582a" providerId="ADAL" clId="{1469466D-464E-4DC8-B62D-B95481E21BC1}" dt="2022-04-05T16:59:31.022" v="0" actId="47"/>
+        <pc:sldMkLst>
+          <pc:docMk/>
+          <pc:sldMk cId="1041664159" sldId="603"/>
+        </pc:sldMkLst>
+      </pc:sldChg>
+      <pc:sldChg chg="addSp delSp modSp new mod addAnim delAnim modAnim modNotesTx">
+        <pc:chgData name="Gerth Stølting Brodal" userId="04ef4784-6591-4f86-a140-f5c3b108582a" providerId="ADAL" clId="{1469466D-464E-4DC8-B62D-B95481E21BC1}" dt="2022-04-06T04:59:21.138" v="837" actId="20577"/>
+        <pc:sldMkLst>
+          <pc:docMk/>
+          <pc:sldMk cId="1429464979" sldId="608"/>
+        </pc:sldMkLst>
+      </pc:sldChg>
+    </pc:docChg>
+  </pc:docChgLst>
+  <pc:docChgLst>
+    <pc:chgData name="Gerth Stølting Brodal" userId="04ef4784-6591-4f86-a140-f5c3b108582a" providerId="ADAL" clId="{C2D62179-613D-4612-B99D-80773BC59D82}"/>
+    <pc:docChg chg="undo custSel modSld">
+      <pc:chgData name="Gerth Stølting Brodal" userId="04ef4784-6591-4f86-a140-f5c3b108582a" providerId="ADAL" clId="{C2D62179-613D-4612-B99D-80773BC59D82}" dt="2024-02-26T08:09:34.899" v="90"/>
+      <pc:docMkLst>
+        <pc:docMk/>
+      </pc:docMkLst>
+      <pc:sldChg chg="modNotesTx">
+        <pc:chgData name="Gerth Stølting Brodal" userId="04ef4784-6591-4f86-a140-f5c3b108582a" providerId="ADAL" clId="{C2D62179-613D-4612-B99D-80773BC59D82}" dt="2024-02-26T08:07:05.182" v="89" actId="6549"/>
+        <pc:sldMkLst>
+          <pc:docMk/>
+          <pc:sldMk cId="567584679" sldId="587"/>
+        </pc:sldMkLst>
+      </pc:sldChg>
+      <pc:sldChg chg="modSp mod">
+        <pc:chgData name="Gerth Stølting Brodal" userId="04ef4784-6591-4f86-a140-f5c3b108582a" providerId="ADAL" clId="{C2D62179-613D-4612-B99D-80773BC59D82}" dt="2024-02-26T07:51:58.368" v="82" actId="207"/>
+        <pc:sldMkLst>
+          <pc:docMk/>
+          <pc:sldMk cId="1526489455" sldId="592"/>
+        </pc:sldMkLst>
+      </pc:sldChg>
+      <pc:sldChg chg="modSp mod modNotesTx">
+        <pc:chgData name="Gerth Stølting Brodal" userId="04ef4784-6591-4f86-a140-f5c3b108582a" providerId="ADAL" clId="{C2D62179-613D-4612-B99D-80773BC59D82}" dt="2024-02-26T07:52:13.521" v="85" actId="207"/>
+        <pc:sldMkLst>
+          <pc:docMk/>
+          <pc:sldMk cId="3354709852" sldId="593"/>
+        </pc:sldMkLst>
+      </pc:sldChg>
+      <pc:sldChg chg="modSp">
+        <pc:chgData name="Gerth Stølting Brodal" userId="04ef4784-6591-4f86-a140-f5c3b108582a" providerId="ADAL" clId="{C2D62179-613D-4612-B99D-80773BC59D82}" dt="2024-02-21T08:44:28.631" v="0" actId="6549"/>
+        <pc:sldMkLst>
+          <pc:docMk/>
+          <pc:sldMk cId="3149368856" sldId="596"/>
+        </pc:sldMkLst>
+      </pc:sldChg>
+      <pc:sldChg chg="modSp mod">
+        <pc:chgData name="Gerth Stølting Brodal" userId="04ef4784-6591-4f86-a140-f5c3b108582a" providerId="ADAL" clId="{C2D62179-613D-4612-B99D-80773BC59D82}" dt="2024-02-21T09:00:15.555" v="64" actId="313"/>
+        <pc:sldMkLst>
+          <pc:docMk/>
+          <pc:sldMk cId="2518119805" sldId="601"/>
+        </pc:sldMkLst>
+      </pc:sldChg>
+      <pc:sldChg chg="modSp mod">
+        <pc:chgData name="Gerth Stølting Brodal" userId="04ef4784-6591-4f86-a140-f5c3b108582a" providerId="ADAL" clId="{C2D62179-613D-4612-B99D-80773BC59D82}" dt="2024-02-25T19:04:53.683" v="76" actId="6549"/>
+        <pc:sldMkLst>
+          <pc:docMk/>
+          <pc:sldMk cId="1045497289" sldId="602"/>
+        </pc:sldMkLst>
+      </pc:sldChg>
+      <pc:sldChg chg="modAnim">
+        <pc:chgData name="Gerth Stølting Brodal" userId="04ef4784-6591-4f86-a140-f5c3b108582a" providerId="ADAL" clId="{C2D62179-613D-4612-B99D-80773BC59D82}" dt="2024-02-26T08:09:34.899" v="90"/>
+        <pc:sldMkLst>
+          <pc:docMk/>
+          <pc:sldMk cId="1220840155" sldId="606"/>
+        </pc:sldMkLst>
+      </pc:sldChg>
+      <pc:sldChg chg="modNotesTx">
+        <pc:chgData name="Gerth Stølting Brodal" userId="04ef4784-6591-4f86-a140-f5c3b108582a" providerId="ADAL" clId="{C2D62179-613D-4612-B99D-80773BC59D82}" dt="2024-02-21T08:56:09.842" v="15" actId="20577"/>
+        <pc:sldMkLst>
+          <pc:docMk/>
+          <pc:sldMk cId="1429464979" sldId="608"/>
+        </pc:sldMkLst>
+      </pc:sldChg>
+    </pc:docChg>
+  </pc:docChgLst>
+  <pc:docChgLst>
+    <pc:chgData name="Gerth Stølting Brodal" userId="04ef4784-6591-4f86-a140-f5c3b108582a" providerId="ADAL" clId="{1F324BB6-B43F-4994-A32E-C009FE83786F}"/>
+    <pc:docChg chg="undo custSel modSld">
+      <pc:chgData name="Gerth Stølting Brodal" userId="04ef4784-6591-4f86-a140-f5c3b108582a" providerId="ADAL" clId="{1F324BB6-B43F-4994-A32E-C009FE83786F}" dt="2021-02-25T21:48:23.855" v="336" actId="20577"/>
+      <pc:docMkLst>
+        <pc:docMk/>
+      </pc:docMkLst>
+      <pc:sldChg chg="modNotesTx">
+        <pc:chgData name="Gerth Stølting Brodal" userId="04ef4784-6591-4f86-a140-f5c3b108582a" providerId="ADAL" clId="{1F324BB6-B43F-4994-A32E-C009FE83786F}" dt="2021-02-25T21:48:23.855" v="336" actId="20577"/>
+        <pc:sldMkLst>
+          <pc:docMk/>
+          <pc:sldMk cId="567584679" sldId="587"/>
+        </pc:sldMkLst>
+      </pc:sldChg>
+      <pc:sldChg chg="modSp">
+        <pc:chgData name="Gerth Stølting Brodal" userId="04ef4784-6591-4f86-a140-f5c3b108582a" providerId="ADAL" clId="{1F324BB6-B43F-4994-A32E-C009FE83786F}" dt="2021-02-25T21:32:18.494" v="135" actId="20577"/>
+        <pc:sldMkLst>
+          <pc:docMk/>
+          <pc:sldMk cId="3354709852" sldId="593"/>
+        </pc:sldMkLst>
+      </pc:sldChg>
+      <pc:sldChg chg="addSp modSp mod modAnim">
+        <pc:chgData name="Gerth Stølting Brodal" userId="04ef4784-6591-4f86-a140-f5c3b108582a" providerId="ADAL" clId="{1F324BB6-B43F-4994-A32E-C009FE83786F}" dt="2021-02-25T21:19:54.304" v="129"/>
+        <pc:sldMkLst>
+          <pc:docMk/>
+          <pc:sldMk cId="345092261" sldId="598"/>
+        </pc:sldMkLst>
+      </pc:sldChg>
+      <pc:sldChg chg="addSp delSp modSp mod modAnim">
+        <pc:chgData name="Gerth Stølting Brodal" userId="04ef4784-6591-4f86-a140-f5c3b108582a" providerId="ADAL" clId="{1F324BB6-B43F-4994-A32E-C009FE83786F}" dt="2021-02-25T19:30:51.449" v="64" actId="1076"/>
+        <pc:sldMkLst>
+          <pc:docMk/>
+          <pc:sldMk cId="3608860866" sldId="599"/>
+        </pc:sldMkLst>
+      </pc:sldChg>
+      <pc:sldChg chg="addSp modSp mod">
+        <pc:chgData name="Gerth Stølting Brodal" userId="04ef4784-6591-4f86-a140-f5c3b108582a" providerId="ADAL" clId="{1F324BB6-B43F-4994-A32E-C009FE83786F}" dt="2021-02-25T21:39:51.129" v="285" actId="1076"/>
+        <pc:sldMkLst>
+          <pc:docMk/>
+          <pc:sldMk cId="2518119805" sldId="601"/>
+        </pc:sldMkLst>
+      </pc:sldChg>
+      <pc:sldChg chg="addSp modSp mod modAnim">
+        <pc:chgData name="Gerth Stølting Brodal" userId="04ef4784-6591-4f86-a140-f5c3b108582a" providerId="ADAL" clId="{1F324BB6-B43F-4994-A32E-C009FE83786F}" dt="2021-02-25T20:00:17.712" v="114" actId="1035"/>
+        <pc:sldMkLst>
+          <pc:docMk/>
+          <pc:sldMk cId="1220840155" sldId="606"/>
+        </pc:sldMkLst>
+      </pc:sldChg>
+      <pc:sldChg chg="modSp mod">
+        <pc:chgData name="Gerth Stølting Brodal" userId="04ef4784-6591-4f86-a140-f5c3b108582a" providerId="ADAL" clId="{1F324BB6-B43F-4994-A32E-C009FE83786F}" dt="2021-02-25T19:51:37.967" v="66" actId="1076"/>
+        <pc:sldMkLst>
+          <pc:docMk/>
+          <pc:sldMk cId="3107987302" sldId="607"/>
         </pc:sldMkLst>
       </pc:sldChg>
     </pc:docChg>
@@ -1263,7 +541,7 @@
           <a:p>
             <a:fld id="{FB1A172F-81D4-4DC4-9113-1DBD56EC3646}" type="datetimeFigureOut">
               <a:rPr lang="en-US" smtClean="0"/>
-              <a:t>2/26/2024</a:t>
+              <a:t>2/23/2025</a:t>
             </a:fld>
             <a:endParaRPr lang="en-US"/>
           </a:p>
@@ -2122,13 +1400,67 @@
             </a:pPr>
             <a:r>
               <a:rPr lang="en-US" dirty="0"/>
-              <a:t>Concatenates list using </a:t>
-            </a:r>
-            <a:r>
-              <a:rPr lang="en-US"/>
-              <a:t>[*] notation</a:t>
-            </a:r>
-            <a:endParaRPr lang="en-US" dirty="0"/>
+              <a:t>Concatenates list using [*] notation</a:t>
+            </a:r>
+          </a:p>
+          <a:p>
+            <a:pPr marL="0" marR="0" lvl="0" indent="0" algn="l" defTabSz="914400" rtl="0" eaLnBrk="1" fontAlgn="auto" latinLnBrk="0" hangingPunct="1">
+              <a:lnSpc>
+                <a:spcPct val="100000"/>
+              </a:lnSpc>
+              <a:spcBef>
+                <a:spcPts val="0"/>
+              </a:spcBef>
+              <a:spcAft>
+                <a:spcPts val="0"/>
+              </a:spcAft>
+              <a:buClrTx/>
+              <a:buSzTx/>
+              <a:buFontTx/>
+              <a:buNone/>
+              <a:tabLst/>
+              <a:defRPr/>
+            </a:pPr>
+            <a:r>
+              <a:rPr lang="en-US" dirty="0" err="1"/>
+              <a:t>plt.axis</a:t>
+            </a:r>
+            <a:r>
+              <a:rPr lang="en-US" dirty="0"/>
+              <a:t>([</a:t>
+            </a:r>
+            <a:r>
+              <a:rPr lang="en-US" dirty="0" err="1"/>
+              <a:t>xmin</a:t>
+            </a:r>
+            <a:r>
+              <a:rPr lang="en-US" dirty="0"/>
+              <a:t>, </a:t>
+            </a:r>
+            <a:r>
+              <a:rPr lang="en-US" dirty="0" err="1"/>
+              <a:t>xmax</a:t>
+            </a:r>
+            <a:r>
+              <a:rPr lang="en-US" dirty="0"/>
+              <a:t>, </a:t>
+            </a:r>
+            <a:r>
+              <a:rPr lang="en-US" dirty="0" err="1"/>
+              <a:t>ymin</a:t>
+            </a:r>
+            <a:r>
+              <a:rPr lang="en-US" dirty="0"/>
+              <a:t>, </a:t>
+            </a:r>
+            <a:r>
+              <a:rPr lang="en-US" dirty="0" err="1"/>
+              <a:t>ymax</a:t>
+            </a:r>
+            <a:r>
+              <a:rPr lang="en-US" dirty="0"/>
+              <a:t>])</a:t>
+            </a:r>
           </a:p>
           <a:p>
             <a:endParaRPr lang="en-US" dirty="0"/>
@@ -3330,7 +2662,7 @@
           <a:p>
             <a:fld id="{0560A9CD-0304-4E0B-9E82-E7E0115DE05B}" type="datetimeFigureOut">
               <a:rPr lang="en-US" smtClean="0"/>
-              <a:t>2/26/2024</a:t>
+              <a:t>2/23/2025</a:t>
             </a:fld>
             <a:endParaRPr lang="en-US"/>
           </a:p>
@@ -3498,7 +2830,7 @@
           <a:p>
             <a:fld id="{0560A9CD-0304-4E0B-9E82-E7E0115DE05B}" type="datetimeFigureOut">
               <a:rPr lang="en-US" smtClean="0"/>
-              <a:t>2/26/2024</a:t>
+              <a:t>2/23/2025</a:t>
             </a:fld>
             <a:endParaRPr lang="en-US"/>
           </a:p>
@@ -3676,7 +3008,7 @@
           <a:p>
             <a:fld id="{0560A9CD-0304-4E0B-9E82-E7E0115DE05B}" type="datetimeFigureOut">
               <a:rPr lang="en-US" smtClean="0"/>
-              <a:t>2/26/2024</a:t>
+              <a:t>2/23/2025</a:t>
             </a:fld>
             <a:endParaRPr lang="en-US"/>
           </a:p>
@@ -3859,7 +3191,7 @@
           <a:p>
             <a:fld id="{0560A9CD-0304-4E0B-9E82-E7E0115DE05B}" type="datetimeFigureOut">
               <a:rPr lang="en-US" smtClean="0"/>
-              <a:t>2/26/2024</a:t>
+              <a:t>2/23/2025</a:t>
             </a:fld>
             <a:endParaRPr lang="en-US"/>
           </a:p>
@@ -4104,7 +3436,7 @@
           <a:p>
             <a:fld id="{0560A9CD-0304-4E0B-9E82-E7E0115DE05B}" type="datetimeFigureOut">
               <a:rPr lang="en-US" smtClean="0"/>
-              <a:t>2/26/2024</a:t>
+              <a:t>2/23/2025</a:t>
             </a:fld>
             <a:endParaRPr lang="en-US"/>
           </a:p>
@@ -4333,7 +3665,7 @@
           <a:p>
             <a:fld id="{0560A9CD-0304-4E0B-9E82-E7E0115DE05B}" type="datetimeFigureOut">
               <a:rPr lang="en-US" smtClean="0"/>
-              <a:t>2/26/2024</a:t>
+              <a:t>2/23/2025</a:t>
             </a:fld>
             <a:endParaRPr lang="en-US"/>
           </a:p>
@@ -4697,7 +4029,7 @@
           <a:p>
             <a:fld id="{0560A9CD-0304-4E0B-9E82-E7E0115DE05B}" type="datetimeFigureOut">
               <a:rPr lang="en-US" smtClean="0"/>
-              <a:t>2/26/2024</a:t>
+              <a:t>2/23/2025</a:t>
             </a:fld>
             <a:endParaRPr lang="en-US"/>
           </a:p>
@@ -4814,7 +4146,7 @@
           <a:p>
             <a:fld id="{0560A9CD-0304-4E0B-9E82-E7E0115DE05B}" type="datetimeFigureOut">
               <a:rPr lang="en-US" smtClean="0"/>
-              <a:t>2/26/2024</a:t>
+              <a:t>2/23/2025</a:t>
             </a:fld>
             <a:endParaRPr lang="en-US"/>
           </a:p>
@@ -4909,7 +4241,7 @@
           <a:p>
             <a:fld id="{0560A9CD-0304-4E0B-9E82-E7E0115DE05B}" type="datetimeFigureOut">
               <a:rPr lang="en-US" smtClean="0"/>
-              <a:t>2/26/2024</a:t>
+              <a:t>2/23/2025</a:t>
             </a:fld>
             <a:endParaRPr lang="en-US"/>
           </a:p>
@@ -5184,7 +4516,7 @@
           <a:p>
             <a:fld id="{0560A9CD-0304-4E0B-9E82-E7E0115DE05B}" type="datetimeFigureOut">
               <a:rPr lang="en-US" smtClean="0"/>
-              <a:t>2/26/2024</a:t>
+              <a:t>2/23/2025</a:t>
             </a:fld>
             <a:endParaRPr lang="en-US"/>
           </a:p>
@@ -5436,7 +4768,7 @@
           <a:p>
             <a:fld id="{0560A9CD-0304-4E0B-9E82-E7E0115DE05B}" type="datetimeFigureOut">
               <a:rPr lang="en-US" smtClean="0"/>
-              <a:t>2/26/2024</a:t>
+              <a:t>2/23/2025</a:t>
             </a:fld>
             <a:endParaRPr lang="en-US"/>
           </a:p>
@@ -5647,7 +4979,7 @@
           <a:p>
             <a:fld id="{0560A9CD-0304-4E0B-9E82-E7E0115DE05B}" type="datetimeFigureOut">
               <a:rPr lang="en-US" smtClean="0"/>
-              <a:t>2/26/2024</a:t>
+              <a:t>2/23/2025</a:t>
             </a:fld>
             <a:endParaRPr lang="en-US"/>
           </a:p>
@@ -31685,7 +31017,7 @@
             </a:r>
             <a:r>
               <a:rPr lang="en-US" dirty="0"/>
-              <a:t>, by Robert C Martin (2009)</a:t>
+              <a:t>, by Robert C. Martin (2009)</a:t>
             </a:r>
             <a:endParaRPr lang="da-DK" dirty="0"/>
           </a:p>

</xml_diff>